<commit_message>
new file:   Documents/weekly report/InGu Kang/Weekly report_InGu-Kang_20120503.docx
</commit_message>
<xml_diff>
--- a/Documents/presentation doc/mid_presentation.pptx
+++ b/Documents/presentation doc/mid_presentation.pptx
@@ -163,10 +163,10 @@
           <c:layoutTarget val="inner"/>
           <c:xMode val="edge"/>
           <c:yMode val="edge"/>
-          <c:x val="0.13756541418769597"/>
-          <c:y val="0.31142121774829296"/>
+          <c:x val="0.13756541418769602"/>
+          <c:y val="0.31142121774829301"/>
           <c:w val="0.82290353753797463"/>
-          <c:h val="0.56776310568666899"/>
+          <c:h val="0.56776310568666888"/>
         </c:manualLayout>
       </c:layout>
       <c:barChart>
@@ -261,25 +261,25 @@
           <c:showVal val="1"/>
         </c:dLbls>
         <c:gapWidth val="75"/>
-        <c:axId val="36066048"/>
-        <c:axId val="36067584"/>
+        <c:axId val="36709120"/>
+        <c:axId val="36710656"/>
       </c:barChart>
       <c:catAx>
-        <c:axId val="36066048"/>
+        <c:axId val="36709120"/>
         <c:scaling>
           <c:orientation val="minMax"/>
         </c:scaling>
         <c:axPos val="b"/>
         <c:majorTickMark val="none"/>
         <c:tickLblPos val="nextTo"/>
-        <c:crossAx val="36067584"/>
+        <c:crossAx val="36710656"/>
         <c:crosses val="autoZero"/>
         <c:auto val="1"/>
         <c:lblAlgn val="ctr"/>
         <c:lblOffset val="100"/>
       </c:catAx>
       <c:valAx>
-        <c:axId val="36067584"/>
+        <c:axId val="36710656"/>
         <c:scaling>
           <c:orientation val="minMax"/>
           <c:min val="0"/>
@@ -288,7 +288,7 @@
         <c:numFmt formatCode="General" sourceLinked="1"/>
         <c:majorTickMark val="none"/>
         <c:tickLblPos val="nextTo"/>
-        <c:crossAx val="36066048"/>
+        <c:crossAx val="36709120"/>
         <c:crosses val="autoZero"/>
         <c:crossBetween val="between"/>
         <c:majorUnit val="20"/>
@@ -300,10 +300,10 @@
         <c:manualLayout>
           <c:xMode val="edge"/>
           <c:yMode val="edge"/>
-          <c:x val="0.18942124246731254"/>
-          <c:y val="3.0763248527941409E-2"/>
-          <c:w val="0.681171680158145"/>
-          <c:h val="0.22344660117129897"/>
+          <c:x val="0.18942124246731259"/>
+          <c:y val="3.0763248527941416E-2"/>
+          <c:w val="0.68117168015814522"/>
+          <c:h val="0.22344660117129905"/>
         </c:manualLayout>
       </c:layout>
     </c:legend>
@@ -405,24 +405,24 @@
           </c:val>
         </c:ser>
         <c:marker val="1"/>
-        <c:axId val="36107776"/>
-        <c:axId val="36109312"/>
+        <c:axId val="36754944"/>
+        <c:axId val="36756480"/>
       </c:lineChart>
       <c:catAx>
-        <c:axId val="36107776"/>
+        <c:axId val="36754944"/>
         <c:scaling>
           <c:orientation val="minMax"/>
         </c:scaling>
         <c:axPos val="b"/>
         <c:tickLblPos val="nextTo"/>
-        <c:crossAx val="36109312"/>
+        <c:crossAx val="36756480"/>
         <c:crosses val="autoZero"/>
         <c:auto val="1"/>
         <c:lblAlgn val="ctr"/>
         <c:lblOffset val="100"/>
       </c:catAx>
       <c:valAx>
-        <c:axId val="36109312"/>
+        <c:axId val="36756480"/>
         <c:scaling>
           <c:orientation val="minMax"/>
           <c:max val="2000"/>
@@ -431,7 +431,7 @@
         <c:majorGridlines/>
         <c:numFmt formatCode="General" sourceLinked="1"/>
         <c:tickLblPos val="nextTo"/>
-        <c:crossAx val="36107776"/>
+        <c:crossAx val="36754944"/>
         <c:crosses val="autoZero"/>
         <c:crossBetween val="between"/>
         <c:majorUnit val="500"/>
@@ -504,14 +504,14 @@
           <a:effectLst/>
           <a:extLst>
             <a:ext uri="{909E8E84-426E-40DD-AFC4-6F175D3DCCD1}">
-              <a14:hiddenFill xmlns:a14="http://schemas.microsoft.com/office/drawing/2010/main" xmlns="">
+              <a14:hiddenFill xmlns="" xmlns:a14="http://schemas.microsoft.com/office/drawing/2010/main">
                 <a:solidFill>
                   <a:schemeClr val="accent1"/>
                 </a:solidFill>
               </a14:hiddenFill>
             </a:ext>
             <a:ext uri="{91240B29-F687-4F45-9708-019B960494DF}">
-              <a14:hiddenLine xmlns:a14="http://schemas.microsoft.com/office/drawing/2010/main" xmlns="" w="9525">
+              <a14:hiddenLine xmlns="" xmlns:a14="http://schemas.microsoft.com/office/drawing/2010/main" w="9525">
                 <a:solidFill>
                   <a:schemeClr val="tx1"/>
                 </a:solidFill>
@@ -521,7 +521,7 @@
               </a14:hiddenLine>
             </a:ext>
             <a:ext uri="{AF507438-7753-43E0-B8FC-AC1667EBCBE1}">
-              <a14:hiddenEffects xmlns:a14="http://schemas.microsoft.com/office/drawing/2010/main" xmlns="">
+              <a14:hiddenEffects xmlns="" xmlns:a14="http://schemas.microsoft.com/office/drawing/2010/main">
                 <a:effectLst>
                   <a:outerShdw dist="35921" dir="2700000" algn="ctr" rotWithShape="0">
                     <a:schemeClr val="bg2"/>
@@ -574,14 +574,14 @@
           <a:effectLst/>
           <a:extLst>
             <a:ext uri="{909E8E84-426E-40DD-AFC4-6F175D3DCCD1}">
-              <a14:hiddenFill xmlns:a14="http://schemas.microsoft.com/office/drawing/2010/main" xmlns="">
+              <a14:hiddenFill xmlns="" xmlns:a14="http://schemas.microsoft.com/office/drawing/2010/main">
                 <a:solidFill>
                   <a:schemeClr val="accent1"/>
                 </a:solidFill>
               </a14:hiddenFill>
             </a:ext>
             <a:ext uri="{91240B29-F687-4F45-9708-019B960494DF}">
-              <a14:hiddenLine xmlns:a14="http://schemas.microsoft.com/office/drawing/2010/main" xmlns="" w="9525">
+              <a14:hiddenLine xmlns="" xmlns:a14="http://schemas.microsoft.com/office/drawing/2010/main" w="9525">
                 <a:solidFill>
                   <a:schemeClr val="tx1"/>
                 </a:solidFill>
@@ -591,7 +591,7 @@
               </a14:hiddenLine>
             </a:ext>
             <a:ext uri="{AF507438-7753-43E0-B8FC-AC1667EBCBE1}">
-              <a14:hiddenEffects xmlns:a14="http://schemas.microsoft.com/office/drawing/2010/main" xmlns="">
+              <a14:hiddenEffects xmlns="" xmlns:a14="http://schemas.microsoft.com/office/drawing/2010/main">
                 <a:effectLst>
                   <a:outerShdw dist="35921" dir="2700000" algn="ctr" rotWithShape="0">
                     <a:schemeClr val="bg2"/>
@@ -649,7 +649,7 @@
           <a:effectLst/>
           <a:extLst>
             <a:ext uri="{AF507438-7753-43E0-B8FC-AC1667EBCBE1}">
-              <a14:hiddenEffects xmlns:a14="http://schemas.microsoft.com/office/drawing/2010/main" xmlns="">
+              <a14:hiddenEffects xmlns="" xmlns:a14="http://schemas.microsoft.com/office/drawing/2010/main">
                 <a:effectLst>
                   <a:outerShdw dist="35921" dir="2700000" algn="ctr" rotWithShape="0">
                     <a:srgbClr val="808080"/>
@@ -658,7 +658,7 @@
               </a14:hiddenEffects>
             </a:ext>
             <a:ext uri="{53640926-AAD7-44D8-BBD7-CCE9431645EC}">
-              <a14:shadowObscured xmlns:a14="http://schemas.microsoft.com/office/drawing/2010/main" xmlns="" val="1"/>
+              <a14:shadowObscured xmlns="" xmlns:a14="http://schemas.microsoft.com/office/drawing/2010/main" val="1"/>
             </a:ext>
           </a:extLst>
         </p:spPr>
@@ -688,14 +688,14 @@
           <a:effectLst/>
           <a:extLst>
             <a:ext uri="{909E8E84-426E-40DD-AFC4-6F175D3DCCD1}">
-              <a14:hiddenFill xmlns:a14="http://schemas.microsoft.com/office/drawing/2010/main" xmlns="">
+              <a14:hiddenFill xmlns="" xmlns:a14="http://schemas.microsoft.com/office/drawing/2010/main">
                 <a:solidFill>
                   <a:schemeClr val="accent1"/>
                 </a:solidFill>
               </a14:hiddenFill>
             </a:ext>
             <a:ext uri="{91240B29-F687-4F45-9708-019B960494DF}">
-              <a14:hiddenLine xmlns:a14="http://schemas.microsoft.com/office/drawing/2010/main" xmlns="" w="9525">
+              <a14:hiddenLine xmlns="" xmlns:a14="http://schemas.microsoft.com/office/drawing/2010/main" w="9525">
                 <a:solidFill>
                   <a:schemeClr val="tx1"/>
                 </a:solidFill>
@@ -705,7 +705,7 @@
               </a14:hiddenLine>
             </a:ext>
             <a:ext uri="{AF507438-7753-43E0-B8FC-AC1667EBCBE1}">
-              <a14:hiddenEffects xmlns:a14="http://schemas.microsoft.com/office/drawing/2010/main" xmlns="">
+              <a14:hiddenEffects xmlns="" xmlns:a14="http://schemas.microsoft.com/office/drawing/2010/main">
                 <a:effectLst>
                   <a:outerShdw dist="35921" dir="2700000" algn="ctr" rotWithShape="0">
                     <a:schemeClr val="bg2"/>
@@ -784,14 +784,14 @@
           <a:effectLst/>
           <a:extLst>
             <a:ext uri="{909E8E84-426E-40DD-AFC4-6F175D3DCCD1}">
-              <a14:hiddenFill xmlns:a14="http://schemas.microsoft.com/office/drawing/2010/main" xmlns="">
+              <a14:hiddenFill xmlns="" xmlns:a14="http://schemas.microsoft.com/office/drawing/2010/main">
                 <a:solidFill>
                   <a:schemeClr val="accent1"/>
                 </a:solidFill>
               </a14:hiddenFill>
             </a:ext>
             <a:ext uri="{91240B29-F687-4F45-9708-019B960494DF}">
-              <a14:hiddenLine xmlns:a14="http://schemas.microsoft.com/office/drawing/2010/main" xmlns="" w="9525">
+              <a14:hiddenLine xmlns="" xmlns:a14="http://schemas.microsoft.com/office/drawing/2010/main" w="9525">
                 <a:solidFill>
                   <a:schemeClr val="tx1"/>
                 </a:solidFill>
@@ -801,7 +801,7 @@
               </a14:hiddenLine>
             </a:ext>
             <a:ext uri="{AF507438-7753-43E0-B8FC-AC1667EBCBE1}">
-              <a14:hiddenEffects xmlns:a14="http://schemas.microsoft.com/office/drawing/2010/main" xmlns="">
+              <a14:hiddenEffects xmlns="" xmlns:a14="http://schemas.microsoft.com/office/drawing/2010/main">
                 <a:effectLst>
                   <a:outerShdw dist="35921" dir="2700000" algn="ctr" rotWithShape="0">
                     <a:schemeClr val="bg2"/>
@@ -854,14 +854,14 @@
           <a:effectLst/>
           <a:extLst>
             <a:ext uri="{909E8E84-426E-40DD-AFC4-6F175D3DCCD1}">
-              <a14:hiddenFill xmlns:a14="http://schemas.microsoft.com/office/drawing/2010/main" xmlns="">
+              <a14:hiddenFill xmlns="" xmlns:a14="http://schemas.microsoft.com/office/drawing/2010/main">
                 <a:solidFill>
                   <a:schemeClr val="accent1"/>
                 </a:solidFill>
               </a14:hiddenFill>
             </a:ext>
             <a:ext uri="{91240B29-F687-4F45-9708-019B960494DF}">
-              <a14:hiddenLine xmlns:a14="http://schemas.microsoft.com/office/drawing/2010/main" xmlns="" w="9525">
+              <a14:hiddenLine xmlns="" xmlns:a14="http://schemas.microsoft.com/office/drawing/2010/main" w="9525">
                 <a:solidFill>
                   <a:schemeClr val="tx1"/>
                 </a:solidFill>
@@ -871,7 +871,7 @@
               </a14:hiddenLine>
             </a:ext>
             <a:ext uri="{AF507438-7753-43E0-B8FC-AC1667EBCBE1}">
-              <a14:hiddenEffects xmlns:a14="http://schemas.microsoft.com/office/drawing/2010/main" xmlns="">
+              <a14:hiddenEffects xmlns="" xmlns:a14="http://schemas.microsoft.com/office/drawing/2010/main">
                 <a:effectLst>
                   <a:outerShdw dist="35921" dir="2700000" algn="ctr" rotWithShape="0">
                     <a:schemeClr val="bg2"/>
@@ -907,7 +907,7 @@
     </p:spTree>
     <p:extLst>
       <p:ext uri="{BB962C8B-B14F-4D97-AF65-F5344CB8AC3E}">
-        <p14:creationId xmlns:p14="http://schemas.microsoft.com/office/powerpoint/2010/main" xmlns="" val="3354467039"/>
+        <p14:creationId xmlns="" xmlns:p14="http://schemas.microsoft.com/office/powerpoint/2010/main" val="3354467039"/>
       </p:ext>
     </p:extLst>
   </p:cSld>
@@ -1684,7 +1684,7 @@
     </p:spTree>
     <p:extLst>
       <p:ext uri="{BB962C8B-B14F-4D97-AF65-F5344CB8AC3E}">
-        <p14:creationId xmlns:p14="http://schemas.microsoft.com/office/powerpoint/2010/main" xmlns="" val="483073219"/>
+        <p14:creationId xmlns="" xmlns:p14="http://schemas.microsoft.com/office/powerpoint/2010/main" val="483073219"/>
       </p:ext>
     </p:extLst>
   </p:cSld>
@@ -2404,7 +2404,7 @@
           </a:xfrm>
           <a:extLst>
             <a:ext uri="{AF507438-7753-43E0-B8FC-AC1667EBCBE1}">
-              <a14:hiddenEffects xmlns:a14="http://schemas.microsoft.com/office/drawing/2010/main" xmlns="">
+              <a14:hiddenEffects xmlns="" xmlns:a14="http://schemas.microsoft.com/office/drawing/2010/main">
                 <a:effectLst>
                   <a:outerShdw dist="17961" dir="2700000" algn="ctr" rotWithShape="0">
                     <a:schemeClr val="bg1"/>
@@ -2448,7 +2448,7 @@
           </a:xfrm>
           <a:extLst>
             <a:ext uri="{AF507438-7753-43E0-B8FC-AC1667EBCBE1}">
-              <a14:hiddenEffects xmlns:a14="http://schemas.microsoft.com/office/drawing/2010/main" xmlns="">
+              <a14:hiddenEffects xmlns="" xmlns:a14="http://schemas.microsoft.com/office/drawing/2010/main">
                 <a:effectLst>
                   <a:outerShdw dist="17961" dir="2700000" algn="ctr" rotWithShape="0">
                     <a:schemeClr val="bg1"/>
@@ -2584,7 +2584,7 @@
     </p:spTree>
     <p:extLst>
       <p:ext uri="{BB962C8B-B14F-4D97-AF65-F5344CB8AC3E}">
-        <p14:creationId xmlns:p14="http://schemas.microsoft.com/office/powerpoint/2010/main" xmlns="" val="3191849363"/>
+        <p14:creationId xmlns="" xmlns:p14="http://schemas.microsoft.com/office/powerpoint/2010/main" val="3191849363"/>
       </p:ext>
     </p:extLst>
   </p:cSld>
@@ -2699,7 +2699,7 @@
     </p:spTree>
     <p:extLst>
       <p:ext uri="{BB962C8B-B14F-4D97-AF65-F5344CB8AC3E}">
-        <p14:creationId xmlns:p14="http://schemas.microsoft.com/office/powerpoint/2010/main" xmlns="" val="1524186507"/>
+        <p14:creationId xmlns="" xmlns:p14="http://schemas.microsoft.com/office/powerpoint/2010/main" val="1524186507"/>
       </p:ext>
     </p:extLst>
   </p:cSld>
@@ -2804,7 +2804,7 @@
     </p:spTree>
     <p:extLst>
       <p:ext uri="{BB962C8B-B14F-4D97-AF65-F5344CB8AC3E}">
-        <p14:creationId xmlns:p14="http://schemas.microsoft.com/office/powerpoint/2010/main" xmlns="" val="3261712152"/>
+        <p14:creationId xmlns="" xmlns:p14="http://schemas.microsoft.com/office/powerpoint/2010/main" val="3261712152"/>
       </p:ext>
     </p:extLst>
   </p:cSld>
@@ -2931,7 +2931,7 @@
     </p:spTree>
     <p:extLst>
       <p:ext uri="{BB962C8B-B14F-4D97-AF65-F5344CB8AC3E}">
-        <p14:creationId xmlns:p14="http://schemas.microsoft.com/office/powerpoint/2010/main" xmlns="" val="346190723"/>
+        <p14:creationId xmlns="" xmlns:p14="http://schemas.microsoft.com/office/powerpoint/2010/main" val="346190723"/>
       </p:ext>
     </p:extLst>
   </p:cSld>
@@ -3154,7 +3154,7 @@
     </p:spTree>
     <p:extLst>
       <p:ext uri="{BB962C8B-B14F-4D97-AF65-F5344CB8AC3E}">
-        <p14:creationId xmlns:p14="http://schemas.microsoft.com/office/powerpoint/2010/main" xmlns="" val="4255224362"/>
+        <p14:creationId xmlns="" xmlns:p14="http://schemas.microsoft.com/office/powerpoint/2010/main" val="4255224362"/>
       </p:ext>
     </p:extLst>
   </p:cSld>
@@ -3516,7 +3516,7 @@
     </p:spTree>
     <p:extLst>
       <p:ext uri="{BB962C8B-B14F-4D97-AF65-F5344CB8AC3E}">
-        <p14:creationId xmlns:p14="http://schemas.microsoft.com/office/powerpoint/2010/main" xmlns="" val="234523478"/>
+        <p14:creationId xmlns="" xmlns:p14="http://schemas.microsoft.com/office/powerpoint/2010/main" val="234523478"/>
       </p:ext>
     </p:extLst>
   </p:cSld>
@@ -3569,7 +3569,7 @@
     </p:spTree>
     <p:extLst>
       <p:ext uri="{BB962C8B-B14F-4D97-AF65-F5344CB8AC3E}">
-        <p14:creationId xmlns:p14="http://schemas.microsoft.com/office/powerpoint/2010/main" xmlns="" val="4170126094"/>
+        <p14:creationId xmlns="" xmlns:p14="http://schemas.microsoft.com/office/powerpoint/2010/main" val="4170126094"/>
       </p:ext>
     </p:extLst>
   </p:cSld>
@@ -3599,7 +3599,7 @@
     </p:spTree>
     <p:extLst>
       <p:ext uri="{BB962C8B-B14F-4D97-AF65-F5344CB8AC3E}">
-        <p14:creationId xmlns:p14="http://schemas.microsoft.com/office/powerpoint/2010/main" xmlns="" val="3131819388"/>
+        <p14:creationId xmlns="" xmlns:p14="http://schemas.microsoft.com/office/powerpoint/2010/main" val="3131819388"/>
       </p:ext>
     </p:extLst>
   </p:cSld>
@@ -3811,7 +3811,7 @@
     </p:spTree>
     <p:extLst>
       <p:ext uri="{BB962C8B-B14F-4D97-AF65-F5344CB8AC3E}">
-        <p14:creationId xmlns:p14="http://schemas.microsoft.com/office/powerpoint/2010/main" xmlns="" val="1266256783"/>
+        <p14:creationId xmlns="" xmlns:p14="http://schemas.microsoft.com/office/powerpoint/2010/main" val="1266256783"/>
       </p:ext>
     </p:extLst>
   </p:cSld>
@@ -4003,7 +4003,7 @@
     </p:spTree>
     <p:extLst>
       <p:ext uri="{BB962C8B-B14F-4D97-AF65-F5344CB8AC3E}">
-        <p14:creationId xmlns:p14="http://schemas.microsoft.com/office/powerpoint/2010/main" xmlns="" val="511494401"/>
+        <p14:creationId xmlns="" xmlns:p14="http://schemas.microsoft.com/office/powerpoint/2010/main" val="511494401"/>
       </p:ext>
     </p:extLst>
   </p:cSld>
@@ -4067,14 +4067,14 @@
           <a:effectLst/>
           <a:extLst>
             <a:ext uri="{909E8E84-426E-40DD-AFC4-6F175D3DCCD1}">
-              <a14:hiddenFill xmlns:a14="http://schemas.microsoft.com/office/drawing/2010/main" xmlns="">
+              <a14:hiddenFill xmlns="" xmlns:a14="http://schemas.microsoft.com/office/drawing/2010/main">
                 <a:solidFill>
                   <a:schemeClr val="accent1"/>
                 </a:solidFill>
               </a14:hiddenFill>
             </a:ext>
             <a:ext uri="{91240B29-F687-4F45-9708-019B960494DF}">
-              <a14:hiddenLine xmlns:a14="http://schemas.microsoft.com/office/drawing/2010/main" xmlns="" w="9525">
+              <a14:hiddenLine xmlns="" xmlns:a14="http://schemas.microsoft.com/office/drawing/2010/main" w="9525">
                 <a:solidFill>
                   <a:schemeClr val="tx1"/>
                 </a:solidFill>
@@ -4084,7 +4084,7 @@
               </a14:hiddenLine>
             </a:ext>
             <a:ext uri="{AF507438-7753-43E0-B8FC-AC1667EBCBE1}">
-              <a14:hiddenEffects xmlns:a14="http://schemas.microsoft.com/office/drawing/2010/main" xmlns="">
+              <a14:hiddenEffects xmlns="" xmlns:a14="http://schemas.microsoft.com/office/drawing/2010/main">
                 <a:effectLst>
                   <a:outerShdw dist="35921" dir="2700000" algn="ctr" rotWithShape="0">
                     <a:schemeClr val="bg2"/>
@@ -4136,14 +4136,14 @@
           <a:effectLst/>
           <a:extLst>
             <a:ext uri="{909E8E84-426E-40DD-AFC4-6F175D3DCCD1}">
-              <a14:hiddenFill xmlns:a14="http://schemas.microsoft.com/office/drawing/2010/main" xmlns="">
+              <a14:hiddenFill xmlns="" xmlns:a14="http://schemas.microsoft.com/office/drawing/2010/main">
                 <a:solidFill>
                   <a:schemeClr val="accent1"/>
                 </a:solidFill>
               </a14:hiddenFill>
             </a:ext>
             <a:ext uri="{91240B29-F687-4F45-9708-019B960494DF}">
-              <a14:hiddenLine xmlns:a14="http://schemas.microsoft.com/office/drawing/2010/main" xmlns="" w="9525">
+              <a14:hiddenLine xmlns="" xmlns:a14="http://schemas.microsoft.com/office/drawing/2010/main" w="9525">
                 <a:solidFill>
                   <a:schemeClr val="tx1"/>
                 </a:solidFill>
@@ -4153,7 +4153,7 @@
               </a14:hiddenLine>
             </a:ext>
             <a:ext uri="{AF507438-7753-43E0-B8FC-AC1667EBCBE1}">
-              <a14:hiddenEffects xmlns:a14="http://schemas.microsoft.com/office/drawing/2010/main" xmlns="">
+              <a14:hiddenEffects xmlns="" xmlns:a14="http://schemas.microsoft.com/office/drawing/2010/main">
                 <a:effectLst>
                   <a:outerShdw dist="35921" dir="2700000" algn="ctr" rotWithShape="0">
                     <a:schemeClr val="bg2"/>
@@ -4746,7 +4746,7 @@
           <p:nvPr>
             <p:extLst>
               <p:ext uri="{D42A27DB-BD31-4B8C-83A1-F6EECF244321}">
-                <p14:modId xmlns:p14="http://schemas.microsoft.com/office/powerpoint/2010/main" xmlns="" val="3019215210"/>
+                <p14:modId xmlns="" xmlns:p14="http://schemas.microsoft.com/office/powerpoint/2010/main" val="3019215210"/>
               </p:ext>
             </p:extLst>
           </p:nvPr>
@@ -5455,7 +5455,7 @@
     </p:spTree>
     <p:extLst>
       <p:ext uri="{BB962C8B-B14F-4D97-AF65-F5344CB8AC3E}">
-        <p14:creationId xmlns:p14="http://schemas.microsoft.com/office/powerpoint/2010/main" xmlns="" val="3872289296"/>
+        <p14:creationId xmlns="" xmlns:p14="http://schemas.microsoft.com/office/powerpoint/2010/main" val="3872289296"/>
       </p:ext>
     </p:extLst>
   </p:cSld>
@@ -5634,38 +5634,9 @@
           </a:p>
           <a:p>
             <a:pPr marL="857250" lvl="2" indent="-457200">
-              <a:buFont typeface="Wingdings" pitchFamily="2" charset="2"/>
-              <a:buChar char="l"/>
-            </a:pPr>
-            <a:r>
-              <a:rPr lang="en-US" altLang="ko-KR" dirty="0">
-                <a:solidFill>
-                  <a:srgbClr val="000000"/>
-                </a:solidFill>
-                <a:latin typeface="HY동녘M" pitchFamily="18" charset="-127"/>
-                <a:ea typeface="HY동녘M" pitchFamily="18" charset="-127"/>
-              </a:rPr>
-              <a:t>	</a:t>
-            </a:r>
-          </a:p>
-          <a:p>
-            <a:pPr marL="857250" lvl="3" indent="0">
               <a:buNone/>
             </a:pPr>
-            <a:endParaRPr lang="en-US" altLang="ko-KR" sz="1600" dirty="0">
-              <a:solidFill>
-                <a:srgbClr val="000000"/>
-              </a:solidFill>
-              <a:latin typeface="HY동녘M" pitchFamily="18" charset="-127"/>
-              <a:ea typeface="HY동녘M" pitchFamily="18" charset="-127"/>
-            </a:endParaRPr>
-          </a:p>
-          <a:p>
-            <a:pPr marL="742950" lvl="2" indent="-342900">
-              <a:buFont typeface="Wingdings" pitchFamily="2" charset="2"/>
-              <a:buChar char="l"/>
-            </a:pPr>
-            <a:endParaRPr lang="en-US" altLang="ko-KR" sz="2000" dirty="0" smtClean="0">
+            <a:endParaRPr lang="en-US" altLang="ko-KR" dirty="0">
               <a:solidFill>
                 <a:srgbClr val="000000"/>
               </a:solidFill>
@@ -5736,7 +5707,7 @@
     </p:spTree>
     <p:extLst>
       <p:ext uri="{BB962C8B-B14F-4D97-AF65-F5344CB8AC3E}">
-        <p14:creationId xmlns="" xmlns:p14="http://schemas.microsoft.com/office/powerpoint/2010/main" val="2718990012"/>
+        <p14:creationId xmlns:p14="http://schemas.microsoft.com/office/powerpoint/2010/main" xmlns="" val="2718990012"/>
       </p:ext>
     </p:extLst>
   </p:cSld>
@@ -5964,19 +5935,6 @@
           <a:p>
             <a:pPr algn="ctr"/>
             <a:r>
-              <a:rPr lang="en-US" altLang="ko-KR" b="1" dirty="0" smtClean="0">
-                <a:solidFill>
-                  <a:schemeClr val="tx1"/>
-                </a:solidFill>
-                <a:latin typeface="HY동녘M" pitchFamily="18" charset="-127"/>
-                <a:ea typeface="HY동녘M" pitchFamily="18" charset="-127"/>
-              </a:rPr>
-              <a:t>Windows</a:t>
-            </a:r>
-          </a:p>
-          <a:p>
-            <a:pPr algn="ctr"/>
-            <a:r>
               <a:rPr lang="ko-KR" altLang="en-US" b="1" dirty="0" err="1" smtClean="0">
                 <a:solidFill>
                   <a:schemeClr val="tx1"/>
@@ -5987,15 +5945,42 @@
               <a:t>카카오톡</a:t>
             </a:r>
             <a:r>
-              <a:rPr lang="en-US" altLang="ko-KR" b="1" dirty="0" smtClean="0">
+              <a:rPr lang="ko-KR" altLang="en-US" b="1" dirty="0" smtClean="0">
                 <a:solidFill>
                   <a:schemeClr val="tx1"/>
                 </a:solidFill>
                 <a:latin typeface="HY동녘M" pitchFamily="18" charset="-127"/>
                 <a:ea typeface="HY동녘M" pitchFamily="18" charset="-127"/>
               </a:rPr>
-              <a:t> App</a:t>
-            </a:r>
+              <a:t> </a:t>
+            </a:r>
+            <a:r>
+              <a:rPr lang="en-US" altLang="ko-KR" b="1" dirty="0" smtClean="0">
+                <a:solidFill>
+                  <a:schemeClr val="tx1"/>
+                </a:solidFill>
+                <a:latin typeface="HY동녘M" pitchFamily="18" charset="-127"/>
+                <a:ea typeface="HY동녘M" pitchFamily="18" charset="-127"/>
+              </a:rPr>
+              <a:t>PC </a:t>
+            </a:r>
+            <a:r>
+              <a:rPr lang="en-US" altLang="ko-KR" b="1" dirty="0" err="1" smtClean="0">
+                <a:solidFill>
+                  <a:schemeClr val="tx1"/>
+                </a:solidFill>
+                <a:latin typeface="HY동녘M" pitchFamily="18" charset="-127"/>
+                <a:ea typeface="HY동녘M" pitchFamily="18" charset="-127"/>
+              </a:rPr>
+              <a:t>Linker_windows</a:t>
+            </a:r>
+            <a:endParaRPr lang="en-US" altLang="ko-KR" b="1" dirty="0" smtClean="0">
+              <a:solidFill>
+                <a:schemeClr val="tx1"/>
+              </a:solidFill>
+              <a:latin typeface="HY동녘M" pitchFamily="18" charset="-127"/>
+              <a:ea typeface="HY동녘M" pitchFamily="18" charset="-127"/>
+            </a:endParaRPr>
           </a:p>
           <a:p>
             <a:pPr algn="ctr"/>
@@ -6123,26 +6108,6 @@
                 <a:ea typeface="HY동녘M" pitchFamily="18" charset="-127"/>
               </a:rPr>
               <a:t>카카오톡</a:t>
-            </a:r>
-            <a:r>
-              <a:rPr lang="ko-KR" altLang="en-US" b="1" dirty="0">
-                <a:solidFill>
-                  <a:schemeClr val="tx1"/>
-                </a:solidFill>
-                <a:latin typeface="HY동녘M" pitchFamily="18" charset="-127"/>
-                <a:ea typeface="HY동녘M" pitchFamily="18" charset="-127"/>
-              </a:rPr>
-              <a:t> </a:t>
-            </a:r>
-            <a:r>
-              <a:rPr lang="en-US" altLang="ko-KR" b="1" dirty="0" smtClean="0">
-                <a:solidFill>
-                  <a:schemeClr val="tx1"/>
-                </a:solidFill>
-                <a:latin typeface="HY동녘M" pitchFamily="18" charset="-127"/>
-                <a:ea typeface="HY동녘M" pitchFamily="18" charset="-127"/>
-              </a:rPr>
-              <a:t>App</a:t>
             </a:r>
             <a:endParaRPr lang="ko-KR" altLang="en-US" b="1" dirty="0">
               <a:solidFill>
@@ -6245,7 +6210,7 @@
           <a:effectLst/>
           <a:extLst>
             <a:ext uri="{AF507438-7753-43E0-B8FC-AC1667EBCBE1}">
-              <a14:hiddenEffects xmlns:a14="http://schemas.microsoft.com/office/drawing/2010/main" xmlns="">
+              <a14:hiddenEffects xmlns="" xmlns:a14="http://schemas.microsoft.com/office/drawing/2010/main">
                 <a:effectLst>
                   <a:outerShdw dist="35921" dir="2700000" algn="ctr" rotWithShape="0">
                     <a:schemeClr val="bg2"/>
@@ -6301,16 +6266,6 @@
               </a:rPr>
               <a:t>카카오톡</a:t>
             </a:r>
-            <a:endParaRPr lang="en-US" altLang="ko-KR" b="1" dirty="0" smtClean="0">
-              <a:solidFill>
-                <a:schemeClr val="tx1"/>
-              </a:solidFill>
-              <a:latin typeface="HY동녘M" pitchFamily="18" charset="-127"/>
-              <a:ea typeface="HY동녘M" pitchFamily="18" charset="-127"/>
-            </a:endParaRPr>
-          </a:p>
-          <a:p>
-            <a:pPr algn="ctr"/>
             <a:r>
               <a:rPr lang="ko-KR" altLang="en-US" b="1" dirty="0" smtClean="0">
                 <a:solidFill>
@@ -6319,7 +6274,7 @@
                 <a:latin typeface="HY동녘M" pitchFamily="18" charset="-127"/>
                 <a:ea typeface="HY동녘M" pitchFamily="18" charset="-127"/>
               </a:rPr>
-              <a:t>연동 </a:t>
+              <a:t> </a:t>
             </a:r>
             <a:r>
               <a:rPr lang="en-US" altLang="ko-KR" b="1" dirty="0" smtClean="0">
@@ -6329,7 +6284,17 @@
                 <a:latin typeface="HY동녘M" pitchFamily="18" charset="-127"/>
                 <a:ea typeface="HY동녘M" pitchFamily="18" charset="-127"/>
               </a:rPr>
-              <a:t>App</a:t>
+              <a:t>PC </a:t>
+            </a:r>
+            <a:r>
+              <a:rPr lang="en-US" altLang="ko-KR" b="1" dirty="0" err="1" smtClean="0">
+                <a:solidFill>
+                  <a:schemeClr val="tx1"/>
+                </a:solidFill>
+                <a:latin typeface="HY동녘M" pitchFamily="18" charset="-127"/>
+                <a:ea typeface="HY동녘M" pitchFamily="18" charset="-127"/>
+              </a:rPr>
+              <a:t>Linker_android</a:t>
             </a:r>
             <a:endParaRPr lang="en-US" altLang="ko-KR" b="1" dirty="0">
               <a:solidFill>
@@ -6673,7 +6638,7 @@
           <a:effectLst/>
           <a:extLst>
             <a:ext uri="{AF507438-7753-43E0-B8FC-AC1667EBCBE1}">
-              <a14:hiddenEffects xmlns:a14="http://schemas.microsoft.com/office/drawing/2010/main" xmlns="">
+              <a14:hiddenEffects xmlns="" xmlns:a14="http://schemas.microsoft.com/office/drawing/2010/main">
                 <a:effectLst>
                   <a:outerShdw dist="35921" dir="2700000" algn="ctr" rotWithShape="0">
                     <a:schemeClr val="bg2"/>
@@ -6730,7 +6695,7 @@
           <a:effectLst/>
           <a:extLst>
             <a:ext uri="{AF507438-7753-43E0-B8FC-AC1667EBCBE1}">
-              <a14:hiddenEffects xmlns:a14="http://schemas.microsoft.com/office/drawing/2010/main" xmlns="">
+              <a14:hiddenEffects xmlns="" xmlns:a14="http://schemas.microsoft.com/office/drawing/2010/main">
                 <a:effectLst>
                   <a:outerShdw dist="35921" dir="2700000" algn="ctr" rotWithShape="0">
                     <a:schemeClr val="bg2"/>
@@ -6921,7 +6886,7 @@
           <a:effectLst/>
           <a:extLst>
             <a:ext uri="{AF507438-7753-43E0-B8FC-AC1667EBCBE1}">
-              <a14:hiddenEffects xmlns:a14="http://schemas.microsoft.com/office/drawing/2010/main" xmlns="">
+              <a14:hiddenEffects xmlns="" xmlns:a14="http://schemas.microsoft.com/office/drawing/2010/main">
                 <a:effectLst>
                   <a:outerShdw dist="35921" dir="2700000" algn="ctr" rotWithShape="0">
                     <a:schemeClr val="bg2"/>
@@ -7101,7 +7066,7 @@
           <a:effectLst/>
           <a:extLst>
             <a:ext uri="{AF507438-7753-43E0-B8FC-AC1667EBCBE1}">
-              <a14:hiddenEffects xmlns:a14="http://schemas.microsoft.com/office/drawing/2010/main" xmlns="">
+              <a14:hiddenEffects xmlns="" xmlns:a14="http://schemas.microsoft.com/office/drawing/2010/main">
                 <a:effectLst>
                   <a:outerShdw dist="35921" dir="2700000" algn="ctr" rotWithShape="0">
                     <a:schemeClr val="bg2"/>
@@ -7488,7 +7453,7 @@
     </p:spTree>
     <p:extLst>
       <p:ext uri="{BB962C8B-B14F-4D97-AF65-F5344CB8AC3E}">
-        <p14:creationId xmlns="" xmlns:p14="http://schemas.microsoft.com/office/powerpoint/2010/main" val="2718990012"/>
+        <p14:creationId xmlns:p14="http://schemas.microsoft.com/office/powerpoint/2010/main" xmlns="" val="2718990012"/>
       </p:ext>
     </p:extLst>
   </p:cSld>
@@ -7604,21 +7569,8 @@
             </a:endParaRPr>
           </a:p>
           <a:p>
-            <a:pPr marL="857250" lvl="3" indent="0">
+            <a:pPr marL="857250" lvl="2" indent="-457200">
               <a:buNone/>
-            </a:pPr>
-            <a:endParaRPr lang="en-US" altLang="ko-KR" dirty="0">
-              <a:solidFill>
-                <a:srgbClr val="000000"/>
-              </a:solidFill>
-              <a:latin typeface="HY동녘M" pitchFamily="18" charset="-127"/>
-              <a:ea typeface="HY동녘M" pitchFamily="18" charset="-127"/>
-            </a:endParaRPr>
-          </a:p>
-          <a:p>
-            <a:pPr marL="857250" lvl="2" indent="-457200">
-              <a:buFont typeface="Wingdings" pitchFamily="2" charset="2"/>
-              <a:buChar char="l"/>
             </a:pPr>
             <a:r>
               <a:rPr lang="en-US" altLang="ko-KR" dirty="0">
@@ -7658,10 +7610,36 @@
           </a:p>
         </p:txBody>
       </p:sp>
+      <p:pic>
+        <p:nvPicPr>
+          <p:cNvPr id="1026" name="Picture 2" descr="N:\.공유받은 폴더\설계프로젝트\자료실, 소스코드\마우스캡쳐.png"/>
+          <p:cNvPicPr>
+            <a:picLocks noChangeAspect="1" noChangeArrowheads="1"/>
+          </p:cNvPicPr>
+          <p:nvPr/>
+        </p:nvPicPr>
+        <p:blipFill>
+          <a:blip r:embed="rId3" cstate="print"/>
+          <a:srcRect/>
+          <a:stretch>
+            <a:fillRect/>
+          </a:stretch>
+        </p:blipFill>
+        <p:spPr bwMode="auto">
+          <a:xfrm>
+            <a:off x="2123728" y="1916832"/>
+            <a:ext cx="3207133" cy="4248472"/>
+          </a:xfrm>
+          <a:prstGeom prst="rect">
+            <a:avLst/>
+          </a:prstGeom>
+          <a:noFill/>
+        </p:spPr>
+      </p:pic>
     </p:spTree>
     <p:extLst>
       <p:ext uri="{BB962C8B-B14F-4D97-AF65-F5344CB8AC3E}">
-        <p14:creationId xmlns="" xmlns:p14="http://schemas.microsoft.com/office/powerpoint/2010/main" val="2718990012"/>
+        <p14:creationId xmlns:p14="http://schemas.microsoft.com/office/powerpoint/2010/main" xmlns="" val="2718990012"/>
       </p:ext>
     </p:extLst>
   </p:cSld>
@@ -8037,7 +8015,7 @@
     </p:spTree>
     <p:extLst>
       <p:ext uri="{BB962C8B-B14F-4D97-AF65-F5344CB8AC3E}">
-        <p14:creationId xmlns:p14="http://schemas.microsoft.com/office/powerpoint/2010/main" xmlns="" val="417403148"/>
+        <p14:creationId xmlns="" xmlns:p14="http://schemas.microsoft.com/office/powerpoint/2010/main" val="417403148"/>
       </p:ext>
     </p:extLst>
   </p:cSld>
@@ -8117,7 +8095,7 @@
           <p:nvPr>
             <p:extLst>
               <p:ext uri="{D42A27DB-BD31-4B8C-83A1-F6EECF244321}">
-                <p14:modId xmlns:p14="http://schemas.microsoft.com/office/powerpoint/2010/main" xmlns="" val="864912804"/>
+                <p14:modId xmlns="" xmlns:p14="http://schemas.microsoft.com/office/powerpoint/2010/main" val="864912804"/>
               </p:ext>
             </p:extLst>
           </p:nvPr>
@@ -8139,7 +8117,7 @@
           <p:nvPr>
             <p:extLst>
               <p:ext uri="{D42A27DB-BD31-4B8C-83A1-F6EECF244321}">
-                <p14:modId xmlns:p14="http://schemas.microsoft.com/office/powerpoint/2010/main" xmlns="" val="550831738"/>
+                <p14:modId xmlns="" xmlns:p14="http://schemas.microsoft.com/office/powerpoint/2010/main" val="550831738"/>
               </p:ext>
             </p:extLst>
           </p:nvPr>
@@ -8251,7 +8229,7 @@
     </p:spTree>
     <p:extLst>
       <p:ext uri="{BB962C8B-B14F-4D97-AF65-F5344CB8AC3E}">
-        <p14:creationId xmlns:p14="http://schemas.microsoft.com/office/powerpoint/2010/main" xmlns="" val="3723977454"/>
+        <p14:creationId xmlns="" xmlns:p14="http://schemas.microsoft.com/office/powerpoint/2010/main" val="3723977454"/>
       </p:ext>
     </p:extLst>
   </p:cSld>
@@ -8410,7 +8388,7 @@
           <a:blip r:embed="rId3" cstate="print">
             <a:extLst>
               <a:ext uri="{28A0092B-C50C-407E-A947-70E740481C1C}">
-                <a14:useLocalDpi xmlns:a14="http://schemas.microsoft.com/office/drawing/2010/main" xmlns="" val="0"/>
+                <a14:useLocalDpi xmlns="" xmlns:a14="http://schemas.microsoft.com/office/drawing/2010/main" val="0"/>
               </a:ext>
             </a:extLst>
           </a:blip>
@@ -8440,7 +8418,7 @@
           <a:blip r:embed="rId4" cstate="print">
             <a:extLst>
               <a:ext uri="{28A0092B-C50C-407E-A947-70E740481C1C}">
-                <a14:useLocalDpi xmlns:a14="http://schemas.microsoft.com/office/drawing/2010/main" xmlns="" val="0"/>
+                <a14:useLocalDpi xmlns="" xmlns:a14="http://schemas.microsoft.com/office/drawing/2010/main" val="0"/>
               </a:ext>
             </a:extLst>
           </a:blip>
@@ -8460,7 +8438,7 @@
           <a:noFill/>
           <a:extLst>
             <a:ext uri="{909E8E84-426E-40DD-AFC4-6F175D3DCCD1}">
-              <a14:hiddenFill xmlns:a14="http://schemas.microsoft.com/office/drawing/2010/main" xmlns="">
+              <a14:hiddenFill xmlns="" xmlns:a14="http://schemas.microsoft.com/office/drawing/2010/main">
                 <a:solidFill>
                   <a:srgbClr val="FFFFFF"/>
                 </a:solidFill>
@@ -8566,7 +8544,7 @@
           <a:blip r:embed="rId5" cstate="print">
             <a:extLst>
               <a:ext uri="{28A0092B-C50C-407E-A947-70E740481C1C}">
-                <a14:useLocalDpi xmlns:a14="http://schemas.microsoft.com/office/drawing/2010/main" xmlns="" val="0"/>
+                <a14:useLocalDpi xmlns="" xmlns:a14="http://schemas.microsoft.com/office/drawing/2010/main" val="0"/>
               </a:ext>
             </a:extLst>
           </a:blip>
@@ -8586,7 +8564,7 @@
           <a:noFill/>
           <a:extLst>
             <a:ext uri="{909E8E84-426E-40DD-AFC4-6F175D3DCCD1}">
-              <a14:hiddenFill xmlns:a14="http://schemas.microsoft.com/office/drawing/2010/main" xmlns="">
+              <a14:hiddenFill xmlns="" xmlns:a14="http://schemas.microsoft.com/office/drawing/2010/main">
                 <a:solidFill>
                   <a:srgbClr val="FFFFFF"/>
                 </a:solidFill>
@@ -8607,7 +8585,7 @@
           <a:blip r:embed="rId6" cstate="print">
             <a:extLst>
               <a:ext uri="{28A0092B-C50C-407E-A947-70E740481C1C}">
-                <a14:useLocalDpi xmlns:a14="http://schemas.microsoft.com/office/drawing/2010/main" xmlns="" val="0"/>
+                <a14:useLocalDpi xmlns="" xmlns:a14="http://schemas.microsoft.com/office/drawing/2010/main" val="0"/>
               </a:ext>
             </a:extLst>
           </a:blip>
@@ -8627,7 +8605,7 @@
           <a:noFill/>
           <a:extLst>
             <a:ext uri="{909E8E84-426E-40DD-AFC4-6F175D3DCCD1}">
-              <a14:hiddenFill xmlns:a14="http://schemas.microsoft.com/office/drawing/2010/main" xmlns="">
+              <a14:hiddenFill xmlns="" xmlns:a14="http://schemas.microsoft.com/office/drawing/2010/main">
                 <a:solidFill>
                   <a:srgbClr val="FFFFFF"/>
                 </a:solidFill>
@@ -8648,7 +8626,7 @@
           <a:blip r:embed="rId7" cstate="print">
             <a:extLst>
               <a:ext uri="{28A0092B-C50C-407E-A947-70E740481C1C}">
-                <a14:useLocalDpi xmlns:a14="http://schemas.microsoft.com/office/drawing/2010/main" xmlns="" val="0"/>
+                <a14:useLocalDpi xmlns="" xmlns:a14="http://schemas.microsoft.com/office/drawing/2010/main" val="0"/>
               </a:ext>
             </a:extLst>
           </a:blip>
@@ -8668,7 +8646,7 @@
           <a:noFill/>
           <a:extLst>
             <a:ext uri="{909E8E84-426E-40DD-AFC4-6F175D3DCCD1}">
-              <a14:hiddenFill xmlns:a14="http://schemas.microsoft.com/office/drawing/2010/main" xmlns="">
+              <a14:hiddenFill xmlns="" xmlns:a14="http://schemas.microsoft.com/office/drawing/2010/main">
                 <a:solidFill>
                   <a:srgbClr val="FFFFFF"/>
                 </a:solidFill>
@@ -8680,7 +8658,7 @@
     </p:spTree>
     <p:extLst>
       <p:ext uri="{BB962C8B-B14F-4D97-AF65-F5344CB8AC3E}">
-        <p14:creationId xmlns:p14="http://schemas.microsoft.com/office/powerpoint/2010/main" xmlns="" val="26222973"/>
+        <p14:creationId xmlns="" xmlns:p14="http://schemas.microsoft.com/office/powerpoint/2010/main" val="26222973"/>
       </p:ext>
     </p:extLst>
   </p:cSld>
@@ -8801,7 +8779,7 @@
           <a:blip r:embed="rId3" cstate="print">
             <a:extLst>
               <a:ext uri="{28A0092B-C50C-407E-A947-70E740481C1C}">
-                <a14:useLocalDpi xmlns:a14="http://schemas.microsoft.com/office/drawing/2010/main" xmlns="" val="0"/>
+                <a14:useLocalDpi xmlns="" xmlns:a14="http://schemas.microsoft.com/office/drawing/2010/main" val="0"/>
               </a:ext>
             </a:extLst>
           </a:blip>
@@ -8821,7 +8799,7 @@
           <a:noFill/>
           <a:extLst>
             <a:ext uri="{909E8E84-426E-40DD-AFC4-6F175D3DCCD1}">
-              <a14:hiddenFill xmlns:a14="http://schemas.microsoft.com/office/drawing/2010/main" xmlns="">
+              <a14:hiddenFill xmlns="" xmlns:a14="http://schemas.microsoft.com/office/drawing/2010/main">
                 <a:solidFill>
                   <a:srgbClr val="FFFFFF"/>
                 </a:solidFill>
@@ -8842,7 +8820,7 @@
           <a:blip r:embed="rId3" cstate="print">
             <a:extLst>
               <a:ext uri="{28A0092B-C50C-407E-A947-70E740481C1C}">
-                <a14:useLocalDpi xmlns:a14="http://schemas.microsoft.com/office/drawing/2010/main" xmlns="" val="0"/>
+                <a14:useLocalDpi xmlns="" xmlns:a14="http://schemas.microsoft.com/office/drawing/2010/main" val="0"/>
               </a:ext>
             </a:extLst>
           </a:blip>
@@ -8862,7 +8840,7 @@
           <a:noFill/>
           <a:extLst>
             <a:ext uri="{909E8E84-426E-40DD-AFC4-6F175D3DCCD1}">
-              <a14:hiddenFill xmlns:a14="http://schemas.microsoft.com/office/drawing/2010/main" xmlns="">
+              <a14:hiddenFill xmlns="" xmlns:a14="http://schemas.microsoft.com/office/drawing/2010/main">
                 <a:solidFill>
                   <a:srgbClr val="FFFFFF"/>
                 </a:solidFill>
@@ -8883,7 +8861,7 @@
           <a:blip r:embed="rId4" cstate="print">
             <a:extLst>
               <a:ext uri="{28A0092B-C50C-407E-A947-70E740481C1C}">
-                <a14:useLocalDpi xmlns:a14="http://schemas.microsoft.com/office/drawing/2010/main" xmlns="" val="0"/>
+                <a14:useLocalDpi xmlns="" xmlns:a14="http://schemas.microsoft.com/office/drawing/2010/main" val="0"/>
               </a:ext>
             </a:extLst>
           </a:blip>
@@ -8903,7 +8881,7 @@
           <a:noFill/>
           <a:extLst>
             <a:ext uri="{909E8E84-426E-40DD-AFC4-6F175D3DCCD1}">
-              <a14:hiddenFill xmlns:a14="http://schemas.microsoft.com/office/drawing/2010/main" xmlns="">
+              <a14:hiddenFill xmlns="" xmlns:a14="http://schemas.microsoft.com/office/drawing/2010/main">
                 <a:solidFill>
                   <a:srgbClr val="FFFFFF"/>
                 </a:solidFill>
@@ -9130,14 +9108,14 @@
           <a:effectLst/>
           <a:extLst>
             <a:ext uri="{909E8E84-426E-40DD-AFC4-6F175D3DCCD1}">
-              <a14:hiddenFill xmlns:a14="http://schemas.microsoft.com/office/drawing/2010/main" xmlns="">
+              <a14:hiddenFill xmlns="" xmlns:a14="http://schemas.microsoft.com/office/drawing/2010/main">
                 <a:solidFill>
                   <a:schemeClr val="accent1"/>
                 </a:solidFill>
               </a14:hiddenFill>
             </a:ext>
             <a:ext uri="{91240B29-F687-4F45-9708-019B960494DF}">
-              <a14:hiddenLine xmlns:a14="http://schemas.microsoft.com/office/drawing/2010/main" xmlns="" w="9525">
+              <a14:hiddenLine xmlns="" xmlns:a14="http://schemas.microsoft.com/office/drawing/2010/main" w="9525">
                 <a:solidFill>
                   <a:schemeClr val="tx1"/>
                 </a:solidFill>
@@ -9147,7 +9125,7 @@
               </a14:hiddenLine>
             </a:ext>
             <a:ext uri="{AF507438-7753-43E0-B8FC-AC1667EBCBE1}">
-              <a14:hiddenEffects xmlns:a14="http://schemas.microsoft.com/office/drawing/2010/main" xmlns="">
+              <a14:hiddenEffects xmlns="" xmlns:a14="http://schemas.microsoft.com/office/drawing/2010/main">
                 <a:effectLst>
                   <a:outerShdw dist="35921" dir="2700000" algn="ctr" rotWithShape="0">
                     <a:schemeClr val="bg2"/>
@@ -9262,7 +9240,7 @@
     </p:spTree>
     <p:extLst>
       <p:ext uri="{BB962C8B-B14F-4D97-AF65-F5344CB8AC3E}">
-        <p14:creationId xmlns:p14="http://schemas.microsoft.com/office/powerpoint/2010/main" xmlns="" val="2437256557"/>
+        <p14:creationId xmlns="" xmlns:p14="http://schemas.microsoft.com/office/powerpoint/2010/main" val="2437256557"/>
       </p:ext>
     </p:extLst>
   </p:cSld>
@@ -9426,7 +9404,7 @@
           <a:blip r:embed="rId3" cstate="print">
             <a:extLst>
               <a:ext uri="{28A0092B-C50C-407E-A947-70E740481C1C}">
-                <a14:useLocalDpi xmlns:a14="http://schemas.microsoft.com/office/drawing/2010/main" xmlns="" val="0"/>
+                <a14:useLocalDpi xmlns="" xmlns:a14="http://schemas.microsoft.com/office/drawing/2010/main" val="0"/>
               </a:ext>
             </a:extLst>
           </a:blip>
@@ -9446,7 +9424,7 @@
           <a:noFill/>
           <a:extLst>
             <a:ext uri="{909E8E84-426E-40DD-AFC4-6F175D3DCCD1}">
-              <a14:hiddenFill xmlns:a14="http://schemas.microsoft.com/office/drawing/2010/main" xmlns="">
+              <a14:hiddenFill xmlns="" xmlns:a14="http://schemas.microsoft.com/office/drawing/2010/main">
                 <a:solidFill>
                   <a:srgbClr val="FFFFFF"/>
                 </a:solidFill>
@@ -9467,7 +9445,7 @@
           <a:blip r:embed="rId4" cstate="print">
             <a:extLst>
               <a:ext uri="{28A0092B-C50C-407E-A947-70E740481C1C}">
-                <a14:useLocalDpi xmlns:a14="http://schemas.microsoft.com/office/drawing/2010/main" xmlns="" val="0"/>
+                <a14:useLocalDpi xmlns="" xmlns:a14="http://schemas.microsoft.com/office/drawing/2010/main" val="0"/>
               </a:ext>
             </a:extLst>
           </a:blip>
@@ -9668,7 +9646,7 @@
           <a:blip r:embed="rId5" cstate="print">
             <a:extLst>
               <a:ext uri="{28A0092B-C50C-407E-A947-70E740481C1C}">
-                <a14:useLocalDpi xmlns:a14="http://schemas.microsoft.com/office/drawing/2010/main" xmlns="" val="0"/>
+                <a14:useLocalDpi xmlns="" xmlns:a14="http://schemas.microsoft.com/office/drawing/2010/main" val="0"/>
               </a:ext>
             </a:extLst>
           </a:blip>
@@ -9688,7 +9666,7 @@
           <a:noFill/>
           <a:extLst>
             <a:ext uri="{909E8E84-426E-40DD-AFC4-6F175D3DCCD1}">
-              <a14:hiddenFill xmlns:a14="http://schemas.microsoft.com/office/drawing/2010/main" xmlns="">
+              <a14:hiddenFill xmlns="" xmlns:a14="http://schemas.microsoft.com/office/drawing/2010/main">
                 <a:solidFill>
                   <a:srgbClr val="FFFFFF"/>
                 </a:solidFill>
@@ -9763,7 +9741,7 @@
           <a:blip r:embed="rId6" cstate="print">
             <a:extLst>
               <a:ext uri="{28A0092B-C50C-407E-A947-70E740481C1C}">
-                <a14:useLocalDpi xmlns:a14="http://schemas.microsoft.com/office/drawing/2010/main" xmlns="" val="0"/>
+                <a14:useLocalDpi xmlns="" xmlns:a14="http://schemas.microsoft.com/office/drawing/2010/main" val="0"/>
               </a:ext>
             </a:extLst>
           </a:blip>
@@ -9783,7 +9761,7 @@
           <a:noFill/>
           <a:extLst>
             <a:ext uri="{909E8E84-426E-40DD-AFC4-6F175D3DCCD1}">
-              <a14:hiddenFill xmlns:a14="http://schemas.microsoft.com/office/drawing/2010/main" xmlns="">
+              <a14:hiddenFill xmlns="" xmlns:a14="http://schemas.microsoft.com/office/drawing/2010/main">
                 <a:solidFill>
                   <a:srgbClr val="FFFFFF"/>
                 </a:solidFill>
@@ -9849,14 +9827,14 @@
           <a:effectLst/>
           <a:extLst>
             <a:ext uri="{909E8E84-426E-40DD-AFC4-6F175D3DCCD1}">
-              <a14:hiddenFill xmlns:a14="http://schemas.microsoft.com/office/drawing/2010/main" xmlns="">
+              <a14:hiddenFill xmlns="" xmlns:a14="http://schemas.microsoft.com/office/drawing/2010/main">
                 <a:solidFill>
                   <a:schemeClr val="accent1"/>
                 </a:solidFill>
               </a14:hiddenFill>
             </a:ext>
             <a:ext uri="{91240B29-F687-4F45-9708-019B960494DF}">
-              <a14:hiddenLine xmlns:a14="http://schemas.microsoft.com/office/drawing/2010/main" xmlns="" w="9525">
+              <a14:hiddenLine xmlns="" xmlns:a14="http://schemas.microsoft.com/office/drawing/2010/main" w="9525">
                 <a:solidFill>
                   <a:schemeClr val="tx1"/>
                 </a:solidFill>
@@ -9866,7 +9844,7 @@
               </a14:hiddenLine>
             </a:ext>
             <a:ext uri="{AF507438-7753-43E0-B8FC-AC1667EBCBE1}">
-              <a14:hiddenEffects xmlns:a14="http://schemas.microsoft.com/office/drawing/2010/main" xmlns="">
+              <a14:hiddenEffects xmlns="" xmlns:a14="http://schemas.microsoft.com/office/drawing/2010/main">
                 <a:effectLst>
                   <a:outerShdw dist="35921" dir="2700000" algn="ctr" rotWithShape="0">
                     <a:schemeClr val="bg2"/>
@@ -9957,7 +9935,7 @@
     </p:spTree>
     <p:extLst>
       <p:ext uri="{BB962C8B-B14F-4D97-AF65-F5344CB8AC3E}">
-        <p14:creationId xmlns:p14="http://schemas.microsoft.com/office/powerpoint/2010/main" xmlns="" val="1709874429"/>
+        <p14:creationId xmlns="" xmlns:p14="http://schemas.microsoft.com/office/powerpoint/2010/main" val="1709874429"/>
       </p:ext>
     </p:extLst>
   </p:cSld>
@@ -10114,7 +10092,7 @@
         </p:nvCxnSpPr>
         <p:spPr>
           <a:xfrm>
-            <a:off x="6228184" y="2132856"/>
+            <a:off x="6372200" y="2132856"/>
             <a:ext cx="0" cy="4536504"/>
           </a:xfrm>
           <a:prstGeom prst="line">
@@ -10150,7 +10128,7 @@
         </p:nvSpPr>
         <p:spPr>
           <a:xfrm>
-            <a:off x="3923928" y="2494057"/>
+            <a:off x="4067944" y="2494057"/>
             <a:ext cx="1773241" cy="430887"/>
           </a:xfrm>
           <a:prstGeom prst="rect">
@@ -10220,7 +10198,7 @@
         </p:nvSpPr>
         <p:spPr>
           <a:xfrm>
-            <a:off x="6444208" y="4077072"/>
+            <a:off x="6588224" y="4077072"/>
             <a:ext cx="2150641" cy="1079999"/>
           </a:xfrm>
           <a:prstGeom prst="rect">
@@ -10273,7 +10251,7 @@
         </p:nvSpPr>
         <p:spPr>
           <a:xfrm>
-            <a:off x="3851920" y="5157192"/>
+            <a:off x="3995936" y="5157192"/>
             <a:ext cx="4740352" cy="1080150"/>
           </a:xfrm>
           <a:prstGeom prst="rect">
@@ -10340,7 +10318,7 @@
         </p:nvSpPr>
         <p:spPr>
           <a:xfrm>
-            <a:off x="3861519" y="2997073"/>
+            <a:off x="4005535" y="2997073"/>
             <a:ext cx="2150641" cy="2160119"/>
           </a:xfrm>
           <a:prstGeom prst="rect">
@@ -10395,13 +10373,6 @@
               </a:rPr>
               <a:t>(Using USB Camera)</a:t>
             </a:r>
-            <a:endParaRPr lang="en-US" altLang="ko-KR" sz="1800" b="1" dirty="0" smtClean="0">
-              <a:solidFill>
-                <a:srgbClr val="000000"/>
-              </a:solidFill>
-              <a:latin typeface="HY강M" pitchFamily="18" charset="-127"/>
-              <a:ea typeface="HY강M" pitchFamily="18" charset="-127"/>
-            </a:endParaRPr>
           </a:p>
         </p:txBody>
       </p:sp>
@@ -10413,7 +10384,7 @@
         </p:nvSpPr>
         <p:spPr>
           <a:xfrm>
-            <a:off x="6444208" y="2997073"/>
+            <a:off x="6588224" y="2997073"/>
             <a:ext cx="2150641" cy="1079999"/>
           </a:xfrm>
           <a:prstGeom prst="rect">
@@ -10472,7 +10443,7 @@
         </p:blipFill>
         <p:spPr bwMode="auto">
           <a:xfrm>
-            <a:off x="6516216" y="3087086"/>
+            <a:off x="6660232" y="3087086"/>
             <a:ext cx="1944216" cy="897590"/>
           </a:xfrm>
           <a:prstGeom prst="rect">
@@ -10495,7 +10466,7 @@
         </p:nvSpPr>
         <p:spPr>
           <a:xfrm>
-            <a:off x="683568" y="2493936"/>
+            <a:off x="539552" y="2493936"/>
             <a:ext cx="1773241" cy="430887"/>
           </a:xfrm>
           <a:prstGeom prst="rect">
@@ -10530,7 +10501,7 @@
         </p:nvSpPr>
         <p:spPr>
           <a:xfrm>
-            <a:off x="467544" y="2996952"/>
+            <a:off x="323528" y="2996952"/>
             <a:ext cx="2150641" cy="2160119"/>
           </a:xfrm>
           <a:prstGeom prst="rect">
@@ -10585,13 +10556,6 @@
               </a:rPr>
               <a:t>(Using USB Camera)</a:t>
             </a:r>
-            <a:endParaRPr lang="en-US" altLang="ko-KR" sz="1800" b="1" dirty="0" smtClean="0">
-              <a:solidFill>
-                <a:srgbClr val="000000"/>
-              </a:solidFill>
-              <a:latin typeface="HY강M" pitchFamily="18" charset="-127"/>
-              <a:ea typeface="HY강M" pitchFamily="18" charset="-127"/>
-            </a:endParaRPr>
           </a:p>
         </p:txBody>
       </p:sp>
@@ -10603,7 +10567,7 @@
         </p:nvSpPr>
         <p:spPr>
           <a:xfrm rot="16200000">
-            <a:off x="2880616" y="5264400"/>
+            <a:off x="2880616" y="4112272"/>
             <a:ext cx="718472" cy="1080120"/>
           </a:xfrm>
           <a:prstGeom prst="downArrow">
@@ -10656,7 +10620,7 @@
         </p:nvGrpSpPr>
         <p:grpSpPr>
           <a:xfrm>
-            <a:off x="3851920" y="2996952"/>
+            <a:off x="3995936" y="2996952"/>
             <a:ext cx="4752528" cy="3240360"/>
             <a:chOff x="3851920" y="2996952"/>
             <a:chExt cx="4752528" cy="3240360"/>
@@ -10701,7 +10665,7 @@
             <a:effectLst/>
             <a:extLst>
               <a:ext uri="{91240B29-F687-4F45-9708-019B960494DF}">
-                <a14:hiddenLine xmlns:a14="http://schemas.microsoft.com/office/drawing/2010/main" xmlns="" w="9525" cap="flat" cmpd="sng" algn="ctr">
+                <a14:hiddenLine xmlns="" xmlns:a14="http://schemas.microsoft.com/office/drawing/2010/main" w="9525" cap="flat" cmpd="sng" algn="ctr">
                   <a:solidFill>
                     <a:schemeClr val="tx1"/>
                   </a:solidFill>
@@ -10712,7 +10676,7 @@
                 </a14:hiddenLine>
               </a:ext>
               <a:ext uri="{AF507438-7753-43E0-B8FC-AC1667EBCBE1}">
-                <a14:hiddenEffects xmlns:a14="http://schemas.microsoft.com/office/drawing/2010/main" xmlns="">
+                <a14:hiddenEffects xmlns="" xmlns:a14="http://schemas.microsoft.com/office/drawing/2010/main">
                   <a:effectLst>
                     <a:outerShdw dist="35921" dir="2700000" algn="ctr" rotWithShape="0">
                       <a:schemeClr val="bg2"/>
@@ -10762,7 +10726,7 @@
             <a:effectLst/>
             <a:extLst>
               <a:ext uri="{91240B29-F687-4F45-9708-019B960494DF}">
-                <a14:hiddenLine xmlns:a14="http://schemas.microsoft.com/office/drawing/2010/main" xmlns="" w="9525" cap="flat" cmpd="sng" algn="ctr">
+                <a14:hiddenLine xmlns="" xmlns:a14="http://schemas.microsoft.com/office/drawing/2010/main" w="9525" cap="flat" cmpd="sng" algn="ctr">
                   <a:solidFill>
                     <a:schemeClr val="tx1"/>
                   </a:solidFill>
@@ -10773,7 +10737,7 @@
                 </a14:hiddenLine>
               </a:ext>
               <a:ext uri="{AF507438-7753-43E0-B8FC-AC1667EBCBE1}">
-                <a14:hiddenEffects xmlns:a14="http://schemas.microsoft.com/office/drawing/2010/main" xmlns="">
+                <a14:hiddenEffects xmlns="" xmlns:a14="http://schemas.microsoft.com/office/drawing/2010/main">
                   <a:effectLst>
                     <a:outerShdw dist="35921" dir="2700000" algn="ctr" rotWithShape="0">
                       <a:schemeClr val="bg2"/>
@@ -10823,7 +10787,7 @@
             <a:effectLst/>
             <a:extLst>
               <a:ext uri="{91240B29-F687-4F45-9708-019B960494DF}">
-                <a14:hiddenLine xmlns:a14="http://schemas.microsoft.com/office/drawing/2010/main" xmlns="" w="9525" cap="flat" cmpd="sng" algn="ctr">
+                <a14:hiddenLine xmlns="" xmlns:a14="http://schemas.microsoft.com/office/drawing/2010/main" w="9525" cap="flat" cmpd="sng" algn="ctr">
                   <a:solidFill>
                     <a:schemeClr val="tx1"/>
                   </a:solidFill>
@@ -10834,7 +10798,7 @@
                 </a14:hiddenLine>
               </a:ext>
               <a:ext uri="{AF507438-7753-43E0-B8FC-AC1667EBCBE1}">
-                <a14:hiddenEffects xmlns:a14="http://schemas.microsoft.com/office/drawing/2010/main" xmlns="">
+                <a14:hiddenEffects xmlns="" xmlns:a14="http://schemas.microsoft.com/office/drawing/2010/main">
                   <a:effectLst>
                     <a:outerShdw dist="35921" dir="2700000" algn="ctr" rotWithShape="0">
                       <a:schemeClr val="bg2"/>
@@ -10884,7 +10848,7 @@
             <a:effectLst/>
             <a:extLst>
               <a:ext uri="{91240B29-F687-4F45-9708-019B960494DF}">
-                <a14:hiddenLine xmlns:a14="http://schemas.microsoft.com/office/drawing/2010/main" xmlns="" w="9525" cap="flat" cmpd="sng" algn="ctr">
+                <a14:hiddenLine xmlns="" xmlns:a14="http://schemas.microsoft.com/office/drawing/2010/main" w="9525" cap="flat" cmpd="sng" algn="ctr">
                   <a:solidFill>
                     <a:schemeClr val="tx1"/>
                   </a:solidFill>
@@ -10895,7 +10859,7 @@
                 </a14:hiddenLine>
               </a:ext>
               <a:ext uri="{AF507438-7753-43E0-B8FC-AC1667EBCBE1}">
-                <a14:hiddenEffects xmlns:a14="http://schemas.microsoft.com/office/drawing/2010/main" xmlns="">
+                <a14:hiddenEffects xmlns="" xmlns:a14="http://schemas.microsoft.com/office/drawing/2010/main">
                   <a:effectLst>
                     <a:outerShdw dist="35921" dir="2700000" algn="ctr" rotWithShape="0">
                       <a:schemeClr val="bg2"/>
@@ -10945,7 +10909,7 @@
             <a:effectLst/>
             <a:extLst>
               <a:ext uri="{91240B29-F687-4F45-9708-019B960494DF}">
-                <a14:hiddenLine xmlns:a14="http://schemas.microsoft.com/office/drawing/2010/main" xmlns="" w="9525" cap="flat" cmpd="sng" algn="ctr">
+                <a14:hiddenLine xmlns="" xmlns:a14="http://schemas.microsoft.com/office/drawing/2010/main" w="9525" cap="flat" cmpd="sng" algn="ctr">
                   <a:solidFill>
                     <a:schemeClr val="tx1"/>
                   </a:solidFill>
@@ -10956,7 +10920,7 @@
                 </a14:hiddenLine>
               </a:ext>
               <a:ext uri="{AF507438-7753-43E0-B8FC-AC1667EBCBE1}">
-                <a14:hiddenEffects xmlns:a14="http://schemas.microsoft.com/office/drawing/2010/main" xmlns="">
+                <a14:hiddenEffects xmlns="" xmlns:a14="http://schemas.microsoft.com/office/drawing/2010/main">
                   <a:effectLst>
                     <a:outerShdw dist="35921" dir="2700000" algn="ctr" rotWithShape="0">
                       <a:schemeClr val="bg2"/>
@@ -11006,7 +10970,7 @@
             <a:effectLst/>
             <a:extLst>
               <a:ext uri="{91240B29-F687-4F45-9708-019B960494DF}">
-                <a14:hiddenLine xmlns:a14="http://schemas.microsoft.com/office/drawing/2010/main" xmlns="" w="9525" cap="flat" cmpd="sng" algn="ctr">
+                <a14:hiddenLine xmlns="" xmlns:a14="http://schemas.microsoft.com/office/drawing/2010/main" w="9525" cap="flat" cmpd="sng" algn="ctr">
                   <a:solidFill>
                     <a:schemeClr val="tx1"/>
                   </a:solidFill>
@@ -11017,7 +10981,7 @@
                 </a14:hiddenLine>
               </a:ext>
               <a:ext uri="{AF507438-7753-43E0-B8FC-AC1667EBCBE1}">
-                <a14:hiddenEffects xmlns:a14="http://schemas.microsoft.com/office/drawing/2010/main" xmlns="">
+                <a14:hiddenEffects xmlns="" xmlns:a14="http://schemas.microsoft.com/office/drawing/2010/main">
                   <a:effectLst>
                     <a:outerShdw dist="35921" dir="2700000" algn="ctr" rotWithShape="0">
                       <a:schemeClr val="bg2"/>
@@ -11037,7 +11001,7 @@
         </p:nvSpPr>
         <p:spPr>
           <a:xfrm>
-            <a:off x="477143" y="5157192"/>
+            <a:off x="333127" y="5157192"/>
             <a:ext cx="2150641" cy="1079999"/>
           </a:xfrm>
           <a:prstGeom prst="rect">
@@ -11089,7 +11053,7 @@
     </p:spTree>
     <p:extLst>
       <p:ext uri="{BB962C8B-B14F-4D97-AF65-F5344CB8AC3E}">
-        <p14:creationId xmlns:p14="http://schemas.microsoft.com/office/powerpoint/2010/main" xmlns="" val="1532431054"/>
+        <p14:creationId xmlns="" xmlns:p14="http://schemas.microsoft.com/office/powerpoint/2010/main" val="1532431054"/>
       </p:ext>
     </p:extLst>
   </p:cSld>
@@ -11169,535 +11133,28 @@
       </p:sp>
       <p:grpSp>
         <p:nvGrpSpPr>
-          <p:cNvPr id="33" name="그룹 32"/>
+          <p:cNvPr id="3" name="그룹 2"/>
           <p:cNvGrpSpPr/>
           <p:nvPr/>
         </p:nvGrpSpPr>
         <p:grpSpPr>
           <a:xfrm>
             <a:off x="767239" y="3886898"/>
-            <a:ext cx="2150641" cy="1808366"/>
+            <a:ext cx="2150641" cy="1125268"/>
             <a:chOff x="1331640" y="2015700"/>
-            <a:chExt cx="2150641" cy="1808366"/>
+            <a:chExt cx="2150641" cy="1125268"/>
           </a:xfrm>
         </p:grpSpPr>
-        <p:grpSp>
-          <p:nvGrpSpPr>
-            <p:cNvPr id="3" name="그룹 2"/>
-            <p:cNvGrpSpPr/>
-            <p:nvPr/>
-          </p:nvGrpSpPr>
-          <p:grpSpPr>
-            <a:xfrm>
-              <a:off x="1331640" y="2015700"/>
-              <a:ext cx="2150641" cy="1125268"/>
-              <a:chOff x="1331640" y="2015700"/>
-              <a:chExt cx="2150641" cy="1125268"/>
-            </a:xfrm>
-          </p:grpSpPr>
-          <p:sp>
-            <p:nvSpPr>
-              <p:cNvPr id="6" name="직사각형 5"/>
-              <p:cNvSpPr/>
-              <p:nvPr/>
-            </p:nvSpPr>
-            <p:spPr>
-              <a:xfrm>
-                <a:off x="1331640" y="2015700"/>
-                <a:ext cx="2150641" cy="1053259"/>
-              </a:xfrm>
-              <a:prstGeom prst="rect">
-                <a:avLst/>
-              </a:prstGeom>
-              <a:solidFill>
-                <a:schemeClr val="bg1">
-                  <a:lumMod val="50000"/>
-                  <a:alpha val="65000"/>
-                </a:schemeClr>
-              </a:solidFill>
-              <a:ln/>
-            </p:spPr>
-            <p:style>
-              <a:lnRef idx="0">
-                <a:schemeClr val="accent2"/>
-              </a:lnRef>
-              <a:fillRef idx="3">
-                <a:schemeClr val="accent2"/>
-              </a:fillRef>
-              <a:effectRef idx="3">
-                <a:schemeClr val="accent2"/>
-              </a:effectRef>
-              <a:fontRef idx="minor">
-                <a:schemeClr val="lt1"/>
-              </a:fontRef>
-            </p:style>
-            <p:txBody>
-              <a:bodyPr rtlCol="0" anchor="ctr"/>
-              <a:lstStyle/>
-              <a:p>
-                <a:pPr algn="ctr"/>
-                <a:r>
-                  <a:rPr lang="en-US" altLang="ko-KR" sz="1800" b="1" dirty="0">
-                    <a:solidFill>
-                      <a:srgbClr val="000000"/>
-                    </a:solidFill>
-                    <a:latin typeface="HY동녘M" pitchFamily="18" charset="-127"/>
-                    <a:ea typeface="HY동녘M" pitchFamily="18" charset="-127"/>
-                  </a:rPr>
-                  <a:t>P</a:t>
-                </a:r>
-                <a:r>
-                  <a:rPr lang="en-US" altLang="ko-KR" sz="1800" b="1" dirty="0" smtClean="0">
-                    <a:solidFill>
-                      <a:srgbClr val="000000"/>
-                    </a:solidFill>
-                    <a:latin typeface="HY동녘M" pitchFamily="18" charset="-127"/>
-                    <a:ea typeface="HY동녘M" pitchFamily="18" charset="-127"/>
-                  </a:rPr>
-                  <a:t>C App</a:t>
-                </a:r>
-                <a:endParaRPr lang="ko-KR" altLang="en-US" sz="1800" b="1" dirty="0">
-                  <a:solidFill>
-                    <a:srgbClr val="000000"/>
-                  </a:solidFill>
-                  <a:latin typeface="HY동녘M" pitchFamily="18" charset="-127"/>
-                  <a:ea typeface="HY동녘M" pitchFamily="18" charset="-127"/>
-                </a:endParaRPr>
-              </a:p>
-            </p:txBody>
-          </p:sp>
-          <p:sp>
-            <p:nvSpPr>
-              <p:cNvPr id="7" name="모서리가 둥근 직사각형 6"/>
-              <p:cNvSpPr/>
-              <p:nvPr/>
-            </p:nvSpPr>
-            <p:spPr>
-              <a:xfrm>
-                <a:off x="1691680" y="2805932"/>
-                <a:ext cx="576064" cy="335036"/>
-              </a:xfrm>
-              <a:prstGeom prst="roundRect">
-                <a:avLst/>
-              </a:prstGeom>
-              <a:ln/>
-            </p:spPr>
-            <p:style>
-              <a:lnRef idx="2">
-                <a:schemeClr val="accent3"/>
-              </a:lnRef>
-              <a:fillRef idx="1">
-                <a:schemeClr val="lt1"/>
-              </a:fillRef>
-              <a:effectRef idx="0">
-                <a:schemeClr val="accent3"/>
-              </a:effectRef>
-              <a:fontRef idx="minor">
-                <a:schemeClr val="dk1"/>
-              </a:fontRef>
-            </p:style>
-            <p:txBody>
-              <a:bodyPr rtlCol="0" anchor="ctr"/>
-              <a:lstStyle/>
-              <a:p>
-                <a:pPr algn="ctr"/>
-                <a:endParaRPr lang="ko-KR" altLang="en-US" dirty="0">
-                  <a:solidFill>
-                    <a:schemeClr val="tx1"/>
-                  </a:solidFill>
-                  <a:latin typeface="HY동녘M" pitchFamily="18" charset="-127"/>
-                  <a:ea typeface="HY동녘M" pitchFamily="18" charset="-127"/>
-                </a:endParaRPr>
-              </a:p>
-            </p:txBody>
-          </p:sp>
-        </p:grpSp>
-        <p:grpSp>
-          <p:nvGrpSpPr>
-            <p:cNvPr id="9" name="그룹 8"/>
-            <p:cNvGrpSpPr/>
-            <p:nvPr/>
-          </p:nvGrpSpPr>
-          <p:grpSpPr>
-            <a:xfrm>
-              <a:off x="1331640" y="2924944"/>
-              <a:ext cx="1368152" cy="899122"/>
-              <a:chOff x="1331640" y="3140968"/>
-              <a:chExt cx="1368152" cy="899122"/>
-            </a:xfrm>
-          </p:grpSpPr>
-          <p:sp>
-            <p:nvSpPr>
-              <p:cNvPr id="2" name="모서리가 둥근 직사각형 1"/>
-              <p:cNvSpPr/>
-              <p:nvPr/>
-            </p:nvSpPr>
-            <p:spPr>
-              <a:xfrm>
-                <a:off x="1691680" y="3140968"/>
-                <a:ext cx="576064" cy="504057"/>
-              </a:xfrm>
-              <a:prstGeom prst="roundRect">
-                <a:avLst/>
-              </a:prstGeom>
-              <a:ln/>
-            </p:spPr>
-            <p:style>
-              <a:lnRef idx="0">
-                <a:schemeClr val="accent1"/>
-              </a:lnRef>
-              <a:fillRef idx="3">
-                <a:schemeClr val="accent1"/>
-              </a:fillRef>
-              <a:effectRef idx="3">
-                <a:schemeClr val="accent1"/>
-              </a:effectRef>
-              <a:fontRef idx="minor">
-                <a:schemeClr val="lt1"/>
-              </a:fontRef>
-            </p:style>
-            <p:txBody>
-              <a:bodyPr rtlCol="0" anchor="ctr"/>
-              <a:lstStyle/>
-              <a:p>
-                <a:pPr algn="ctr"/>
-                <a:endParaRPr lang="ko-KR" altLang="en-US" dirty="0">
-                  <a:solidFill>
-                    <a:schemeClr val="tx1"/>
-                  </a:solidFill>
-                  <a:latin typeface="HY동녘M" pitchFamily="18" charset="-127"/>
-                  <a:ea typeface="HY동녘M" pitchFamily="18" charset="-127"/>
-                </a:endParaRPr>
-              </a:p>
-            </p:txBody>
-          </p:sp>
-          <p:sp>
-            <p:nvSpPr>
-              <p:cNvPr id="4" name="직사각형 3"/>
-              <p:cNvSpPr/>
-              <p:nvPr/>
-            </p:nvSpPr>
-            <p:spPr>
-              <a:xfrm>
-                <a:off x="1331640" y="3462390"/>
-                <a:ext cx="1368152" cy="577700"/>
-              </a:xfrm>
-              <a:prstGeom prst="rect">
-                <a:avLst/>
-              </a:prstGeom>
-              <a:ln/>
-            </p:spPr>
-            <p:style>
-              <a:lnRef idx="0">
-                <a:schemeClr val="accent2"/>
-              </a:lnRef>
-              <a:fillRef idx="3">
-                <a:schemeClr val="accent2"/>
-              </a:fillRef>
-              <a:effectRef idx="3">
-                <a:schemeClr val="accent2"/>
-              </a:effectRef>
-              <a:fontRef idx="minor">
-                <a:schemeClr val="lt1"/>
-              </a:fontRef>
-            </p:style>
-            <p:txBody>
-              <a:bodyPr rtlCol="0" anchor="ctr"/>
-              <a:lstStyle/>
-              <a:p>
-                <a:pPr algn="ctr"/>
-                <a:r>
-                  <a:rPr lang="en-US" altLang="ko-KR" sz="1800" b="1" dirty="0" smtClean="0">
-                    <a:solidFill>
-                      <a:srgbClr val="000000"/>
-                    </a:solidFill>
-                    <a:latin typeface="HY동녘M" pitchFamily="18" charset="-127"/>
-                    <a:ea typeface="HY동녘M" pitchFamily="18" charset="-127"/>
-                  </a:rPr>
-                  <a:t>USB</a:t>
-                </a:r>
-                <a:endParaRPr lang="ko-KR" altLang="en-US" sz="1800" b="1" dirty="0">
-                  <a:solidFill>
-                    <a:srgbClr val="000000"/>
-                  </a:solidFill>
-                  <a:latin typeface="HY동녘M" pitchFamily="18" charset="-127"/>
-                  <a:ea typeface="HY동녘M" pitchFamily="18" charset="-127"/>
-                </a:endParaRPr>
-              </a:p>
-            </p:txBody>
-          </p:sp>
-        </p:grpSp>
-      </p:grpSp>
-      <p:grpSp>
-        <p:nvGrpSpPr>
-          <p:cNvPr id="34" name="그룹 33"/>
-          <p:cNvGrpSpPr/>
-          <p:nvPr/>
-        </p:nvGrpSpPr>
-        <p:grpSpPr>
-          <a:xfrm>
-            <a:off x="3419872" y="3862718"/>
-            <a:ext cx="2150641" cy="2446602"/>
-            <a:chOff x="5364088" y="1270430"/>
-            <a:chExt cx="2150641" cy="2446602"/>
-          </a:xfrm>
-        </p:grpSpPr>
-        <p:grpSp>
-          <p:nvGrpSpPr>
-            <p:cNvPr id="10" name="그룹 9"/>
-            <p:cNvGrpSpPr/>
-            <p:nvPr/>
-          </p:nvGrpSpPr>
-          <p:grpSpPr>
-            <a:xfrm>
-              <a:off x="5364088" y="1270430"/>
-              <a:ext cx="2150641" cy="1125268"/>
-              <a:chOff x="1331640" y="2015700"/>
-              <a:chExt cx="2150641" cy="1125268"/>
-            </a:xfrm>
-          </p:grpSpPr>
-          <p:sp>
-            <p:nvSpPr>
-              <p:cNvPr id="11" name="직사각형 10"/>
-              <p:cNvSpPr/>
-              <p:nvPr/>
-            </p:nvSpPr>
-            <p:spPr>
-              <a:xfrm>
-                <a:off x="1331640" y="2015700"/>
-                <a:ext cx="2150641" cy="1053259"/>
-              </a:xfrm>
-              <a:prstGeom prst="rect">
-                <a:avLst/>
-              </a:prstGeom>
-              <a:solidFill>
-                <a:schemeClr val="bg1">
-                  <a:lumMod val="50000"/>
-                  <a:alpha val="65000"/>
-                </a:schemeClr>
-              </a:solidFill>
-              <a:ln/>
-            </p:spPr>
-            <p:style>
-              <a:lnRef idx="0">
-                <a:schemeClr val="accent2"/>
-              </a:lnRef>
-              <a:fillRef idx="3">
-                <a:schemeClr val="accent2"/>
-              </a:fillRef>
-              <a:effectRef idx="3">
-                <a:schemeClr val="accent2"/>
-              </a:effectRef>
-              <a:fontRef idx="minor">
-                <a:schemeClr val="lt1"/>
-              </a:fontRef>
-            </p:style>
-            <p:txBody>
-              <a:bodyPr rtlCol="0" anchor="ctr"/>
-              <a:lstStyle/>
-              <a:p>
-                <a:pPr algn="ctr"/>
-                <a:r>
-                  <a:rPr lang="en-US" altLang="ko-KR" sz="1800" b="1" dirty="0">
-                    <a:solidFill>
-                      <a:srgbClr val="000000"/>
-                    </a:solidFill>
-                    <a:latin typeface="HY동녘M" pitchFamily="18" charset="-127"/>
-                    <a:ea typeface="HY동녘M" pitchFamily="18" charset="-127"/>
-                  </a:rPr>
-                  <a:t>P</a:t>
-                </a:r>
-                <a:r>
-                  <a:rPr lang="en-US" altLang="ko-KR" sz="1800" b="1" dirty="0" smtClean="0">
-                    <a:solidFill>
-                      <a:srgbClr val="000000"/>
-                    </a:solidFill>
-                    <a:latin typeface="HY동녘M" pitchFamily="18" charset="-127"/>
-                    <a:ea typeface="HY동녘M" pitchFamily="18" charset="-127"/>
-                  </a:rPr>
-                  <a:t>C App</a:t>
-                </a:r>
-                <a:endParaRPr lang="ko-KR" altLang="en-US" sz="1800" b="1" dirty="0">
-                  <a:solidFill>
-                    <a:srgbClr val="000000"/>
-                  </a:solidFill>
-                  <a:latin typeface="HY동녘M" pitchFamily="18" charset="-127"/>
-                  <a:ea typeface="HY동녘M" pitchFamily="18" charset="-127"/>
-                </a:endParaRPr>
-              </a:p>
-            </p:txBody>
-          </p:sp>
-          <p:sp>
-            <p:nvSpPr>
-              <p:cNvPr id="12" name="모서리가 둥근 직사각형 11"/>
-              <p:cNvSpPr/>
-              <p:nvPr/>
-            </p:nvSpPr>
-            <p:spPr>
-              <a:xfrm>
-                <a:off x="1691680" y="2805932"/>
-                <a:ext cx="576064" cy="335036"/>
-              </a:xfrm>
-              <a:prstGeom prst="roundRect">
-                <a:avLst/>
-              </a:prstGeom>
-              <a:ln/>
-            </p:spPr>
-            <p:style>
-              <a:lnRef idx="2">
-                <a:schemeClr val="accent3"/>
-              </a:lnRef>
-              <a:fillRef idx="1">
-                <a:schemeClr val="lt1"/>
-              </a:fillRef>
-              <a:effectRef idx="0">
-                <a:schemeClr val="accent3"/>
-              </a:effectRef>
-              <a:fontRef idx="minor">
-                <a:schemeClr val="dk1"/>
-              </a:fontRef>
-            </p:style>
-            <p:txBody>
-              <a:bodyPr rtlCol="0" anchor="ctr"/>
-              <a:lstStyle/>
-              <a:p>
-                <a:pPr algn="ctr"/>
-                <a:endParaRPr lang="ko-KR" altLang="en-US" dirty="0">
-                  <a:solidFill>
-                    <a:schemeClr val="tx1"/>
-                  </a:solidFill>
-                  <a:latin typeface="HY동녘M" pitchFamily="18" charset="-127"/>
-                  <a:ea typeface="HY동녘M" pitchFamily="18" charset="-127"/>
-                </a:endParaRPr>
-              </a:p>
-            </p:txBody>
-          </p:sp>
-        </p:grpSp>
-        <p:grpSp>
-          <p:nvGrpSpPr>
-            <p:cNvPr id="16" name="그룹 15"/>
-            <p:cNvGrpSpPr/>
-            <p:nvPr/>
-          </p:nvGrpSpPr>
-          <p:grpSpPr>
-            <a:xfrm>
-              <a:off x="5364088" y="2169837"/>
-              <a:ext cx="1368152" cy="899122"/>
-              <a:chOff x="1331640" y="3140968"/>
-              <a:chExt cx="1368152" cy="899122"/>
-            </a:xfrm>
-          </p:grpSpPr>
-          <p:sp>
-            <p:nvSpPr>
-              <p:cNvPr id="17" name="모서리가 둥근 직사각형 16"/>
-              <p:cNvSpPr/>
-              <p:nvPr/>
-            </p:nvSpPr>
-            <p:spPr>
-              <a:xfrm>
-                <a:off x="1691680" y="3140968"/>
-                <a:ext cx="576064" cy="504057"/>
-              </a:xfrm>
-              <a:prstGeom prst="roundRect">
-                <a:avLst/>
-              </a:prstGeom>
-              <a:ln/>
-            </p:spPr>
-            <p:style>
-              <a:lnRef idx="0">
-                <a:schemeClr val="accent1"/>
-              </a:lnRef>
-              <a:fillRef idx="3">
-                <a:schemeClr val="accent1"/>
-              </a:fillRef>
-              <a:effectRef idx="3">
-                <a:schemeClr val="accent1"/>
-              </a:effectRef>
-              <a:fontRef idx="minor">
-                <a:schemeClr val="lt1"/>
-              </a:fontRef>
-            </p:style>
-            <p:txBody>
-              <a:bodyPr rtlCol="0" anchor="ctr"/>
-              <a:lstStyle/>
-              <a:p>
-                <a:pPr algn="ctr"/>
-                <a:endParaRPr lang="ko-KR" altLang="en-US" dirty="0">
-                  <a:solidFill>
-                    <a:schemeClr val="tx1"/>
-                  </a:solidFill>
-                  <a:latin typeface="HY동녘M" pitchFamily="18" charset="-127"/>
-                  <a:ea typeface="HY동녘M" pitchFamily="18" charset="-127"/>
-                </a:endParaRPr>
-              </a:p>
-            </p:txBody>
-          </p:sp>
-          <p:sp>
-            <p:nvSpPr>
-              <p:cNvPr id="18" name="직사각형 17"/>
-              <p:cNvSpPr/>
-              <p:nvPr/>
-            </p:nvSpPr>
-            <p:spPr>
-              <a:xfrm>
-                <a:off x="1331640" y="3462390"/>
-                <a:ext cx="1368152" cy="577700"/>
-              </a:xfrm>
-              <a:prstGeom prst="rect">
-                <a:avLst/>
-              </a:prstGeom>
-              <a:ln/>
-            </p:spPr>
-            <p:style>
-              <a:lnRef idx="0">
-                <a:schemeClr val="accent2"/>
-              </a:lnRef>
-              <a:fillRef idx="3">
-                <a:schemeClr val="accent2"/>
-              </a:fillRef>
-              <a:effectRef idx="3">
-                <a:schemeClr val="accent2"/>
-              </a:effectRef>
-              <a:fontRef idx="minor">
-                <a:schemeClr val="lt1"/>
-              </a:fontRef>
-            </p:style>
-            <p:txBody>
-              <a:bodyPr rtlCol="0" anchor="ctr"/>
-              <a:lstStyle/>
-              <a:p>
-                <a:pPr algn="ctr"/>
-                <a:r>
-                  <a:rPr lang="en-US" altLang="ko-KR" sz="1800" b="1" dirty="0" smtClean="0">
-                    <a:solidFill>
-                      <a:srgbClr val="000000"/>
-                    </a:solidFill>
-                    <a:latin typeface="HY동녘M" pitchFamily="18" charset="-127"/>
-                    <a:ea typeface="HY동녘M" pitchFamily="18" charset="-127"/>
-                  </a:rPr>
-                  <a:t>USB/IP</a:t>
-                </a:r>
-                <a:endParaRPr lang="ko-KR" altLang="en-US" sz="1800" b="1" dirty="0">
-                  <a:solidFill>
-                    <a:srgbClr val="000000"/>
-                  </a:solidFill>
-                  <a:latin typeface="HY동녘M" pitchFamily="18" charset="-127"/>
-                  <a:ea typeface="HY동녘M" pitchFamily="18" charset="-127"/>
-                </a:endParaRPr>
-              </a:p>
-            </p:txBody>
-          </p:sp>
-        </p:grpSp>
         <p:sp>
           <p:nvSpPr>
-            <p:cNvPr id="21" name="직사각형 20"/>
+            <p:cNvPr id="6" name="직사각형 5"/>
             <p:cNvSpPr/>
             <p:nvPr/>
           </p:nvSpPr>
           <p:spPr>
             <a:xfrm>
-              <a:off x="5364089" y="3068959"/>
-              <a:ext cx="1800200" cy="648073"/>
+              <a:off x="1331640" y="2015700"/>
+              <a:ext cx="2150641" cy="1053259"/>
             </a:xfrm>
             <a:prstGeom prst="rect">
               <a:avLst/>
@@ -11736,11 +11193,61 @@
                   <a:latin typeface="HY동녘M" pitchFamily="18" charset="-127"/>
                   <a:ea typeface="HY동녘M" pitchFamily="18" charset="-127"/>
                 </a:rPr>
-                <a:t>Android App</a:t>
+                <a:t>Windows App</a:t>
               </a:r>
-              <a:endParaRPr lang="ko-KR" altLang="en-US" sz="1800" b="1" dirty="0">
-                <a:solidFill>
-                  <a:srgbClr val="000000"/>
+            </a:p>
+            <a:p>
+              <a:r>
+                <a:rPr lang="en-US" altLang="ko-KR" sz="1800" b="1" dirty="0" smtClean="0">
+                  <a:solidFill>
+                    <a:srgbClr val="000000"/>
+                  </a:solidFill>
+                  <a:latin typeface="HY강M" pitchFamily="18" charset="-127"/>
+                  <a:ea typeface="HY강M" pitchFamily="18" charset="-127"/>
+                </a:rPr>
+                <a:t>(Using USB Camera)</a:t>
+              </a:r>
+            </a:p>
+          </p:txBody>
+        </p:sp>
+        <p:sp>
+          <p:nvSpPr>
+            <p:cNvPr id="7" name="모서리가 둥근 직사각형 6"/>
+            <p:cNvSpPr/>
+            <p:nvPr/>
+          </p:nvSpPr>
+          <p:spPr>
+            <a:xfrm>
+              <a:off x="1691680" y="2805932"/>
+              <a:ext cx="576064" cy="335036"/>
+            </a:xfrm>
+            <a:prstGeom prst="roundRect">
+              <a:avLst/>
+            </a:prstGeom>
+            <a:ln/>
+          </p:spPr>
+          <p:style>
+            <a:lnRef idx="2">
+              <a:schemeClr val="accent3"/>
+            </a:lnRef>
+            <a:fillRef idx="1">
+              <a:schemeClr val="lt1"/>
+            </a:fillRef>
+            <a:effectRef idx="0">
+              <a:schemeClr val="accent3"/>
+            </a:effectRef>
+            <a:fontRef idx="minor">
+              <a:schemeClr val="dk1"/>
+            </a:fontRef>
+          </p:style>
+          <p:txBody>
+            <a:bodyPr rtlCol="0" anchor="ctr"/>
+            <a:lstStyle/>
+            <a:p>
+              <a:pPr algn="ctr"/>
+              <a:endParaRPr lang="ko-KR" altLang="en-US" dirty="0">
+                <a:solidFill>
+                  <a:schemeClr val="tx1"/>
                 </a:solidFill>
                 <a:latin typeface="HY동녘M" pitchFamily="18" charset="-127"/>
                 <a:ea typeface="HY동녘M" pitchFamily="18" charset="-127"/>
@@ -11751,184 +11258,45 @@
       </p:grpSp>
       <p:grpSp>
         <p:nvGrpSpPr>
-          <p:cNvPr id="36" name="그룹 35"/>
+          <p:cNvPr id="9" name="그룹 8"/>
           <p:cNvGrpSpPr/>
           <p:nvPr/>
         </p:nvGrpSpPr>
         <p:grpSpPr>
           <a:xfrm>
-            <a:off x="6084168" y="3848699"/>
-            <a:ext cx="2723122" cy="2460622"/>
-            <a:chOff x="5377271" y="4005064"/>
-            <a:chExt cx="2723122" cy="2460622"/>
+            <a:off x="767239" y="4796142"/>
+            <a:ext cx="1368152" cy="899122"/>
+            <a:chOff x="1331640" y="3140968"/>
+            <a:chExt cx="1368152" cy="899122"/>
           </a:xfrm>
         </p:grpSpPr>
-        <p:grpSp>
-          <p:nvGrpSpPr>
-            <p:cNvPr id="23" name="그룹 22"/>
-            <p:cNvGrpSpPr/>
-            <p:nvPr/>
-          </p:nvGrpSpPr>
-          <p:grpSpPr>
-            <a:xfrm>
-              <a:off x="5377271" y="4005064"/>
-              <a:ext cx="2150641" cy="1125268"/>
-              <a:chOff x="1331640" y="2015700"/>
-              <a:chExt cx="2150641" cy="1125268"/>
-            </a:xfrm>
-          </p:grpSpPr>
-          <p:sp>
-            <p:nvSpPr>
-              <p:cNvPr id="24" name="직사각형 23"/>
-              <p:cNvSpPr/>
-              <p:nvPr/>
-            </p:nvSpPr>
-            <p:spPr>
-              <a:xfrm>
-                <a:off x="1331640" y="2015700"/>
-                <a:ext cx="2150641" cy="1053259"/>
-              </a:xfrm>
-              <a:prstGeom prst="rect">
-                <a:avLst/>
-              </a:prstGeom>
-              <a:solidFill>
-                <a:schemeClr val="bg1">
-                  <a:lumMod val="50000"/>
-                  <a:alpha val="65000"/>
-                </a:schemeClr>
-              </a:solidFill>
-              <a:ln/>
-            </p:spPr>
-            <p:style>
-              <a:lnRef idx="0">
-                <a:schemeClr val="accent2"/>
-              </a:lnRef>
-              <a:fillRef idx="3">
-                <a:schemeClr val="accent2"/>
-              </a:fillRef>
-              <a:effectRef idx="3">
-                <a:schemeClr val="accent2"/>
-              </a:effectRef>
-              <a:fontRef idx="minor">
-                <a:schemeClr val="lt1"/>
-              </a:fontRef>
-            </p:style>
-            <p:txBody>
-              <a:bodyPr rtlCol="0" anchor="ctr"/>
-              <a:lstStyle/>
-              <a:p>
-                <a:pPr algn="ctr"/>
-                <a:r>
-                  <a:rPr lang="en-US" altLang="ko-KR" sz="1800" b="1" dirty="0">
-                    <a:solidFill>
-                      <a:srgbClr val="000000"/>
-                    </a:solidFill>
-                    <a:latin typeface="HY동녘M" pitchFamily="18" charset="-127"/>
-                    <a:ea typeface="HY동녘M" pitchFamily="18" charset="-127"/>
-                  </a:rPr>
-                  <a:t>P</a:t>
-                </a:r>
-                <a:r>
-                  <a:rPr lang="en-US" altLang="ko-KR" sz="1800" b="1" dirty="0" smtClean="0">
-                    <a:solidFill>
-                      <a:srgbClr val="000000"/>
-                    </a:solidFill>
-                    <a:latin typeface="HY동녘M" pitchFamily="18" charset="-127"/>
-                    <a:ea typeface="HY동녘M" pitchFamily="18" charset="-127"/>
-                  </a:rPr>
-                  <a:t>C App</a:t>
-                </a:r>
-                <a:endParaRPr lang="ko-KR" altLang="en-US" sz="1800" b="1" dirty="0">
-                  <a:solidFill>
-                    <a:srgbClr val="000000"/>
-                  </a:solidFill>
-                  <a:latin typeface="HY동녘M" pitchFamily="18" charset="-127"/>
-                  <a:ea typeface="HY동녘M" pitchFamily="18" charset="-127"/>
-                </a:endParaRPr>
-              </a:p>
-            </p:txBody>
-          </p:sp>
-          <p:sp>
-            <p:nvSpPr>
-              <p:cNvPr id="25" name="모서리가 둥근 직사각형 24"/>
-              <p:cNvSpPr/>
-              <p:nvPr/>
-            </p:nvSpPr>
-            <p:spPr>
-              <a:xfrm>
-                <a:off x="1691680" y="2805932"/>
-                <a:ext cx="576064" cy="335036"/>
-              </a:xfrm>
-              <a:prstGeom prst="roundRect">
-                <a:avLst/>
-              </a:prstGeom>
-              <a:ln/>
-            </p:spPr>
-            <p:style>
-              <a:lnRef idx="2">
-                <a:schemeClr val="accent3"/>
-              </a:lnRef>
-              <a:fillRef idx="1">
-                <a:schemeClr val="lt1"/>
-              </a:fillRef>
-              <a:effectRef idx="0">
-                <a:schemeClr val="accent3"/>
-              </a:effectRef>
-              <a:fontRef idx="minor">
-                <a:schemeClr val="dk1"/>
-              </a:fontRef>
-            </p:style>
-            <p:txBody>
-              <a:bodyPr rtlCol="0" anchor="ctr"/>
-              <a:lstStyle/>
-              <a:p>
-                <a:pPr algn="ctr"/>
-                <a:endParaRPr lang="ko-KR" altLang="en-US" dirty="0">
-                  <a:solidFill>
-                    <a:schemeClr val="tx1"/>
-                  </a:solidFill>
-                  <a:latin typeface="HY동녘M" pitchFamily="18" charset="-127"/>
-                  <a:ea typeface="HY동녘M" pitchFamily="18" charset="-127"/>
-                </a:endParaRPr>
-              </a:p>
-            </p:txBody>
-          </p:sp>
-        </p:grpSp>
         <p:sp>
           <p:nvSpPr>
-            <p:cNvPr id="30" name="이등변 삼각형 29"/>
+            <p:cNvPr id="2" name="모서리가 둥근 직사각형 1"/>
             <p:cNvSpPr/>
             <p:nvPr/>
           </p:nvSpPr>
           <p:spPr>
             <a:xfrm>
-              <a:off x="6732240" y="4795297"/>
-              <a:ext cx="576064" cy="289888"/>
+              <a:off x="1691680" y="3140968"/>
+              <a:ext cx="576064" cy="504057"/>
             </a:xfrm>
-            <a:prstGeom prst="triangle">
+            <a:prstGeom prst="roundRect">
               <a:avLst/>
             </a:prstGeom>
             <a:solidFill>
-              <a:schemeClr val="bg1"/>
+              <a:srgbClr val="FFC000"/>
             </a:solidFill>
-            <a:ln>
-              <a:solidFill>
-                <a:schemeClr val="bg1">
-                  <a:alpha val="80000"/>
-                </a:schemeClr>
-              </a:solidFill>
-            </a:ln>
+            <a:ln/>
           </p:spPr>
           <p:style>
-            <a:lnRef idx="2">
-              <a:schemeClr val="accent1">
-                <a:shade val="50000"/>
-              </a:schemeClr>
+            <a:lnRef idx="0">
+              <a:schemeClr val="accent1"/>
             </a:lnRef>
-            <a:fillRef idx="1">
+            <a:fillRef idx="3">
               <a:schemeClr val="accent1"/>
             </a:fillRef>
-            <a:effectRef idx="0">
+            <a:effectRef idx="3">
               <a:schemeClr val="accent1"/>
             </a:effectRef>
             <a:fontRef idx="minor">
@@ -11950,182 +11318,600 @@
             </a:p>
           </p:txBody>
         </p:sp>
-        <p:grpSp>
-          <p:nvGrpSpPr>
-            <p:cNvPr id="32" name="그룹 31"/>
-            <p:cNvGrpSpPr/>
+        <p:sp>
+          <p:nvSpPr>
+            <p:cNvPr id="4" name="직사각형 3"/>
+            <p:cNvSpPr/>
             <p:nvPr/>
-          </p:nvGrpSpPr>
-          <p:grpSpPr>
+          </p:nvSpPr>
+          <p:spPr>
             <a:xfrm>
-              <a:off x="6300192" y="4937674"/>
-              <a:ext cx="1800201" cy="1528012"/>
-              <a:chOff x="3419872" y="5225706"/>
-              <a:chExt cx="1800201" cy="1528012"/>
+              <a:off x="1331640" y="3462390"/>
+              <a:ext cx="1368152" cy="577700"/>
             </a:xfrm>
-          </p:grpSpPr>
-          <p:sp>
-            <p:nvSpPr>
-              <p:cNvPr id="31" name="이등변 삼각형 30"/>
-              <p:cNvSpPr/>
-              <p:nvPr/>
-            </p:nvSpPr>
-            <p:spPr>
-              <a:xfrm>
-                <a:off x="3779912" y="5225706"/>
-                <a:ext cx="720000" cy="363533"/>
-              </a:xfrm>
-              <a:prstGeom prst="triangle">
-                <a:avLst/>
-              </a:prstGeom>
-              <a:ln/>
-            </p:spPr>
-            <p:style>
-              <a:lnRef idx="0">
-                <a:schemeClr val="accent1"/>
-              </a:lnRef>
-              <a:fillRef idx="3">
-                <a:schemeClr val="accent1"/>
-              </a:fillRef>
-              <a:effectRef idx="3">
-                <a:schemeClr val="accent1"/>
-              </a:effectRef>
-              <a:fontRef idx="minor">
-                <a:schemeClr val="lt1"/>
-              </a:fontRef>
-            </p:style>
-            <p:txBody>
-              <a:bodyPr rtlCol="0" anchor="ctr"/>
-              <a:lstStyle/>
-              <a:p>
-                <a:pPr algn="ctr"/>
-                <a:endParaRPr lang="ko-KR" altLang="en-US" b="1" dirty="0">
-                  <a:solidFill>
-                    <a:schemeClr val="tx1"/>
-                  </a:solidFill>
-                  <a:latin typeface="HY동녘M" pitchFamily="18" charset="-127"/>
-                  <a:ea typeface="HY동녘M" pitchFamily="18" charset="-127"/>
-                </a:endParaRPr>
-              </a:p>
-            </p:txBody>
-          </p:sp>
-          <p:sp>
-            <p:nvSpPr>
-              <p:cNvPr id="28" name="직사각형 27"/>
-              <p:cNvSpPr/>
-              <p:nvPr/>
-            </p:nvSpPr>
-            <p:spPr>
-              <a:xfrm>
-                <a:off x="3419872" y="5515595"/>
-                <a:ext cx="1368152" cy="577700"/>
-              </a:xfrm>
-              <a:prstGeom prst="rect">
-                <a:avLst/>
-              </a:prstGeom>
-              <a:ln/>
-            </p:spPr>
-            <p:style>
-              <a:lnRef idx="0">
-                <a:schemeClr val="accent2"/>
-              </a:lnRef>
-              <a:fillRef idx="3">
-                <a:schemeClr val="accent2"/>
-              </a:fillRef>
-              <a:effectRef idx="3">
-                <a:schemeClr val="accent2"/>
-              </a:effectRef>
-              <a:fontRef idx="minor">
-                <a:schemeClr val="lt1"/>
-              </a:fontRef>
-            </p:style>
-            <p:txBody>
-              <a:bodyPr rtlCol="0" anchor="ctr"/>
-              <a:lstStyle/>
-              <a:p>
-                <a:pPr algn="ctr"/>
-                <a:r>
-                  <a:rPr lang="en-US" altLang="ko-KR" sz="1800" b="1" dirty="0" smtClean="0">
-                    <a:solidFill>
-                      <a:srgbClr val="000000"/>
-                    </a:solidFill>
-                    <a:latin typeface="HY동녘M" pitchFamily="18" charset="-127"/>
-                    <a:ea typeface="HY동녘M" pitchFamily="18" charset="-127"/>
-                  </a:rPr>
-                  <a:t>TCP/IP</a:t>
-                </a:r>
-                <a:endParaRPr lang="ko-KR" altLang="en-US" sz="1800" b="1" dirty="0">
+            <a:prstGeom prst="rect">
+              <a:avLst/>
+            </a:prstGeom>
+            <a:solidFill>
+              <a:srgbClr val="FFC000"/>
+            </a:solidFill>
+            <a:ln/>
+          </p:spPr>
+          <p:style>
+            <a:lnRef idx="0">
+              <a:schemeClr val="accent2"/>
+            </a:lnRef>
+            <a:fillRef idx="3">
+              <a:schemeClr val="accent2"/>
+            </a:fillRef>
+            <a:effectRef idx="3">
+              <a:schemeClr val="accent2"/>
+            </a:effectRef>
+            <a:fontRef idx="minor">
+              <a:schemeClr val="lt1"/>
+            </a:fontRef>
+          </p:style>
+          <p:txBody>
+            <a:bodyPr rtlCol="0" anchor="ctr"/>
+            <a:lstStyle/>
+            <a:p>
+              <a:pPr algn="ctr"/>
+              <a:r>
+                <a:rPr lang="en-US" altLang="ko-KR" sz="1800" b="1" dirty="0" smtClean="0">
                   <a:solidFill>
                     <a:srgbClr val="000000"/>
                   </a:solidFill>
                   <a:latin typeface="HY동녘M" pitchFamily="18" charset="-127"/>
                   <a:ea typeface="HY동녘M" pitchFamily="18" charset="-127"/>
-                </a:endParaRPr>
-              </a:p>
-            </p:txBody>
-          </p:sp>
-          <p:sp>
-            <p:nvSpPr>
-              <p:cNvPr id="29" name="직사각형 28"/>
-              <p:cNvSpPr/>
-              <p:nvPr/>
-            </p:nvSpPr>
-            <p:spPr>
-              <a:xfrm>
-                <a:off x="3419873" y="6105645"/>
-                <a:ext cx="1800200" cy="648073"/>
-              </a:xfrm>
-              <a:prstGeom prst="rect">
-                <a:avLst/>
-              </a:prstGeom>
-              <a:solidFill>
-                <a:srgbClr val="00B0F0">
-                  <a:alpha val="65000"/>
-                </a:srgbClr>
-              </a:solidFill>
-              <a:ln/>
-            </p:spPr>
-            <p:style>
-              <a:lnRef idx="0">
-                <a:schemeClr val="accent2"/>
-              </a:lnRef>
-              <a:fillRef idx="3">
-                <a:schemeClr val="accent2"/>
-              </a:fillRef>
-              <a:effectRef idx="3">
-                <a:schemeClr val="accent2"/>
-              </a:effectRef>
-              <a:fontRef idx="minor">
-                <a:schemeClr val="lt1"/>
-              </a:fontRef>
-            </p:style>
-            <p:txBody>
-              <a:bodyPr rtlCol="0" anchor="ctr"/>
-              <a:lstStyle/>
-              <a:p>
-                <a:pPr algn="ctr"/>
-                <a:r>
-                  <a:rPr lang="en-US" altLang="ko-KR" sz="1800" b="1" dirty="0" smtClean="0">
-                    <a:solidFill>
-                      <a:srgbClr val="000000"/>
-                    </a:solidFill>
-                    <a:latin typeface="HY동녘M" pitchFamily="18" charset="-127"/>
-                    <a:ea typeface="HY동녘M" pitchFamily="18" charset="-127"/>
-                  </a:rPr>
-                  <a:t>Android App</a:t>
-                </a:r>
-                <a:endParaRPr lang="ko-KR" altLang="en-US" sz="1800" b="1" dirty="0">
+                </a:rPr>
+                <a:t>USB Camera</a:t>
+              </a:r>
+              <a:endParaRPr lang="ko-KR" altLang="en-US" sz="1800" b="1" dirty="0">
+                <a:solidFill>
+                  <a:srgbClr val="000000"/>
+                </a:solidFill>
+                <a:latin typeface="HY동녘M" pitchFamily="18" charset="-127"/>
+                <a:ea typeface="HY동녘M" pitchFamily="18" charset="-127"/>
+              </a:endParaRPr>
+            </a:p>
+          </p:txBody>
+        </p:sp>
+      </p:grpSp>
+      <p:grpSp>
+        <p:nvGrpSpPr>
+          <p:cNvPr id="10" name="그룹 9"/>
+          <p:cNvGrpSpPr/>
+          <p:nvPr/>
+        </p:nvGrpSpPr>
+        <p:grpSpPr>
+          <a:xfrm>
+            <a:off x="3419872" y="3862718"/>
+            <a:ext cx="2150641" cy="1125268"/>
+            <a:chOff x="1331640" y="2015700"/>
+            <a:chExt cx="2150641" cy="1125268"/>
+          </a:xfrm>
+        </p:grpSpPr>
+        <p:sp>
+          <p:nvSpPr>
+            <p:cNvPr id="11" name="직사각형 10"/>
+            <p:cNvSpPr/>
+            <p:nvPr/>
+          </p:nvSpPr>
+          <p:spPr>
+            <a:xfrm>
+              <a:off x="1331640" y="2015700"/>
+              <a:ext cx="2150641" cy="1053259"/>
+            </a:xfrm>
+            <a:prstGeom prst="rect">
+              <a:avLst/>
+            </a:prstGeom>
+            <a:solidFill>
+              <a:srgbClr val="00B0F0">
+                <a:alpha val="65000"/>
+              </a:srgbClr>
+            </a:solidFill>
+            <a:ln/>
+          </p:spPr>
+          <p:style>
+            <a:lnRef idx="0">
+              <a:schemeClr val="accent2"/>
+            </a:lnRef>
+            <a:fillRef idx="3">
+              <a:schemeClr val="accent2"/>
+            </a:fillRef>
+            <a:effectRef idx="3">
+              <a:schemeClr val="accent2"/>
+            </a:effectRef>
+            <a:fontRef idx="minor">
+              <a:schemeClr val="lt1"/>
+            </a:fontRef>
+          </p:style>
+          <p:txBody>
+            <a:bodyPr rtlCol="0" anchor="ctr"/>
+            <a:lstStyle/>
+            <a:p>
+              <a:r>
+                <a:rPr lang="en-US" altLang="ko-KR" sz="1800" b="1" dirty="0" smtClean="0">
                   <a:solidFill>
                     <a:srgbClr val="000000"/>
                   </a:solidFill>
                   <a:latin typeface="HY동녘M" pitchFamily="18" charset="-127"/>
                   <a:ea typeface="HY동녘M" pitchFamily="18" charset="-127"/>
-                </a:endParaRPr>
-              </a:p>
-            </p:txBody>
-          </p:sp>
-        </p:grpSp>
+                </a:rPr>
+                <a:t>Windows App</a:t>
+              </a:r>
+            </a:p>
+            <a:p>
+              <a:r>
+                <a:rPr lang="en-US" altLang="ko-KR" sz="1800" b="1" dirty="0" smtClean="0">
+                  <a:solidFill>
+                    <a:srgbClr val="000000"/>
+                  </a:solidFill>
+                  <a:latin typeface="HY강M" pitchFamily="18" charset="-127"/>
+                  <a:ea typeface="HY강M" pitchFamily="18" charset="-127"/>
+                </a:rPr>
+                <a:t>(Using USB Camera)</a:t>
+              </a:r>
+            </a:p>
+          </p:txBody>
+        </p:sp>
+        <p:sp>
+          <p:nvSpPr>
+            <p:cNvPr id="12" name="모서리가 둥근 직사각형 11"/>
+            <p:cNvSpPr/>
+            <p:nvPr/>
+          </p:nvSpPr>
+          <p:spPr>
+            <a:xfrm>
+              <a:off x="1691680" y="2805932"/>
+              <a:ext cx="576064" cy="335036"/>
+            </a:xfrm>
+            <a:prstGeom prst="roundRect">
+              <a:avLst/>
+            </a:prstGeom>
+            <a:ln/>
+          </p:spPr>
+          <p:style>
+            <a:lnRef idx="2">
+              <a:schemeClr val="accent3"/>
+            </a:lnRef>
+            <a:fillRef idx="1">
+              <a:schemeClr val="lt1"/>
+            </a:fillRef>
+            <a:effectRef idx="0">
+              <a:schemeClr val="accent3"/>
+            </a:effectRef>
+            <a:fontRef idx="minor">
+              <a:schemeClr val="dk1"/>
+            </a:fontRef>
+          </p:style>
+          <p:txBody>
+            <a:bodyPr rtlCol="0" anchor="ctr"/>
+            <a:lstStyle/>
+            <a:p>
+              <a:pPr algn="ctr"/>
+              <a:endParaRPr lang="ko-KR" altLang="en-US" dirty="0">
+                <a:solidFill>
+                  <a:schemeClr val="tx1"/>
+                </a:solidFill>
+                <a:latin typeface="HY동녘M" pitchFamily="18" charset="-127"/>
+                <a:ea typeface="HY동녘M" pitchFamily="18" charset="-127"/>
+              </a:endParaRPr>
+            </a:p>
+          </p:txBody>
+        </p:sp>
       </p:grpSp>
+      <p:grpSp>
+        <p:nvGrpSpPr>
+          <p:cNvPr id="16" name="그룹 15"/>
+          <p:cNvGrpSpPr/>
+          <p:nvPr/>
+        </p:nvGrpSpPr>
+        <p:grpSpPr>
+          <a:xfrm>
+            <a:off x="3419872" y="4762125"/>
+            <a:ext cx="1368152" cy="899122"/>
+            <a:chOff x="1331640" y="3140968"/>
+            <a:chExt cx="1368152" cy="899122"/>
+          </a:xfrm>
+        </p:grpSpPr>
+        <p:sp>
+          <p:nvSpPr>
+            <p:cNvPr id="17" name="모서리가 둥근 직사각형 16"/>
+            <p:cNvSpPr/>
+            <p:nvPr/>
+          </p:nvSpPr>
+          <p:spPr>
+            <a:xfrm>
+              <a:off x="1691680" y="3140968"/>
+              <a:ext cx="576064" cy="504057"/>
+            </a:xfrm>
+            <a:prstGeom prst="roundRect">
+              <a:avLst/>
+            </a:prstGeom>
+            <a:solidFill>
+              <a:srgbClr val="FFC000"/>
+            </a:solidFill>
+            <a:ln/>
+          </p:spPr>
+          <p:style>
+            <a:lnRef idx="0">
+              <a:schemeClr val="accent1"/>
+            </a:lnRef>
+            <a:fillRef idx="3">
+              <a:schemeClr val="accent1"/>
+            </a:fillRef>
+            <a:effectRef idx="3">
+              <a:schemeClr val="accent1"/>
+            </a:effectRef>
+            <a:fontRef idx="minor">
+              <a:schemeClr val="lt1"/>
+            </a:fontRef>
+          </p:style>
+          <p:txBody>
+            <a:bodyPr rtlCol="0" anchor="ctr"/>
+            <a:lstStyle/>
+            <a:p>
+              <a:pPr algn="ctr"/>
+              <a:endParaRPr lang="ko-KR" altLang="en-US" dirty="0">
+                <a:solidFill>
+                  <a:schemeClr val="tx1"/>
+                </a:solidFill>
+                <a:latin typeface="HY동녘M" pitchFamily="18" charset="-127"/>
+                <a:ea typeface="HY동녘M" pitchFamily="18" charset="-127"/>
+              </a:endParaRPr>
+            </a:p>
+          </p:txBody>
+        </p:sp>
+        <p:sp>
+          <p:nvSpPr>
+            <p:cNvPr id="18" name="직사각형 17"/>
+            <p:cNvSpPr/>
+            <p:nvPr/>
+          </p:nvSpPr>
+          <p:spPr>
+            <a:xfrm>
+              <a:off x="1331640" y="3462390"/>
+              <a:ext cx="1368152" cy="577700"/>
+            </a:xfrm>
+            <a:prstGeom prst="rect">
+              <a:avLst/>
+            </a:prstGeom>
+            <a:solidFill>
+              <a:srgbClr val="FFC000"/>
+            </a:solidFill>
+            <a:ln/>
+          </p:spPr>
+          <p:style>
+            <a:lnRef idx="0">
+              <a:schemeClr val="accent2"/>
+            </a:lnRef>
+            <a:fillRef idx="3">
+              <a:schemeClr val="accent2"/>
+            </a:fillRef>
+            <a:effectRef idx="3">
+              <a:schemeClr val="accent2"/>
+            </a:effectRef>
+            <a:fontRef idx="minor">
+              <a:schemeClr val="lt1"/>
+            </a:fontRef>
+          </p:style>
+          <p:txBody>
+            <a:bodyPr rtlCol="0" anchor="ctr"/>
+            <a:lstStyle/>
+            <a:p>
+              <a:pPr algn="ctr"/>
+              <a:r>
+                <a:rPr lang="en-US" altLang="ko-KR" sz="1800" b="1" dirty="0" smtClean="0">
+                  <a:solidFill>
+                    <a:srgbClr val="000000"/>
+                  </a:solidFill>
+                  <a:latin typeface="HY동녘M" pitchFamily="18" charset="-127"/>
+                  <a:ea typeface="HY동녘M" pitchFamily="18" charset="-127"/>
+                </a:rPr>
+                <a:t>USB/IP</a:t>
+              </a:r>
+              <a:endParaRPr lang="ko-KR" altLang="en-US" sz="1800" b="1" dirty="0">
+                <a:solidFill>
+                  <a:srgbClr val="000000"/>
+                </a:solidFill>
+                <a:latin typeface="HY동녘M" pitchFamily="18" charset="-127"/>
+                <a:ea typeface="HY동녘M" pitchFamily="18" charset="-127"/>
+              </a:endParaRPr>
+            </a:p>
+          </p:txBody>
+        </p:sp>
+      </p:grpSp>
+      <p:grpSp>
+        <p:nvGrpSpPr>
+          <p:cNvPr id="23" name="그룹 22"/>
+          <p:cNvGrpSpPr/>
+          <p:nvPr/>
+        </p:nvGrpSpPr>
+        <p:grpSpPr>
+          <a:xfrm>
+            <a:off x="6084168" y="3848699"/>
+            <a:ext cx="2150641" cy="1125268"/>
+            <a:chOff x="1331640" y="2015700"/>
+            <a:chExt cx="2150641" cy="1125268"/>
+          </a:xfrm>
+        </p:grpSpPr>
+        <p:sp>
+          <p:nvSpPr>
+            <p:cNvPr id="24" name="직사각형 23"/>
+            <p:cNvSpPr/>
+            <p:nvPr/>
+          </p:nvSpPr>
+          <p:spPr>
+            <a:xfrm>
+              <a:off x="1331640" y="2015700"/>
+              <a:ext cx="2150641" cy="1053259"/>
+            </a:xfrm>
+            <a:prstGeom prst="rect">
+              <a:avLst/>
+            </a:prstGeom>
+            <a:solidFill>
+              <a:srgbClr val="00B0F0">
+                <a:alpha val="65000"/>
+              </a:srgbClr>
+            </a:solidFill>
+            <a:ln/>
+          </p:spPr>
+          <p:style>
+            <a:lnRef idx="0">
+              <a:schemeClr val="accent2"/>
+            </a:lnRef>
+            <a:fillRef idx="3">
+              <a:schemeClr val="accent2"/>
+            </a:fillRef>
+            <a:effectRef idx="3">
+              <a:schemeClr val="accent2"/>
+            </a:effectRef>
+            <a:fontRef idx="minor">
+              <a:schemeClr val="lt1"/>
+            </a:fontRef>
+          </p:style>
+          <p:txBody>
+            <a:bodyPr rtlCol="0" anchor="ctr"/>
+            <a:lstStyle/>
+            <a:p>
+              <a:r>
+                <a:rPr lang="en-US" altLang="ko-KR" sz="1800" b="1" dirty="0" smtClean="0">
+                  <a:solidFill>
+                    <a:srgbClr val="000000"/>
+                  </a:solidFill>
+                  <a:latin typeface="HY동녘M" pitchFamily="18" charset="-127"/>
+                  <a:ea typeface="HY동녘M" pitchFamily="18" charset="-127"/>
+                </a:rPr>
+                <a:t>Windows App</a:t>
+              </a:r>
+            </a:p>
+            <a:p>
+              <a:r>
+                <a:rPr lang="en-US" altLang="ko-KR" sz="1800" b="1" dirty="0" smtClean="0">
+                  <a:solidFill>
+                    <a:srgbClr val="000000"/>
+                  </a:solidFill>
+                  <a:latin typeface="HY강M" pitchFamily="18" charset="-127"/>
+                  <a:ea typeface="HY강M" pitchFamily="18" charset="-127"/>
+                </a:rPr>
+                <a:t>(Using USB Camera)</a:t>
+              </a:r>
+            </a:p>
+          </p:txBody>
+        </p:sp>
+        <p:sp>
+          <p:nvSpPr>
+            <p:cNvPr id="25" name="모서리가 둥근 직사각형 24"/>
+            <p:cNvSpPr/>
+            <p:nvPr/>
+          </p:nvSpPr>
+          <p:spPr>
+            <a:xfrm>
+              <a:off x="1691680" y="2805932"/>
+              <a:ext cx="576064" cy="335036"/>
+            </a:xfrm>
+            <a:prstGeom prst="roundRect">
+              <a:avLst/>
+            </a:prstGeom>
+            <a:ln/>
+          </p:spPr>
+          <p:style>
+            <a:lnRef idx="2">
+              <a:schemeClr val="accent3"/>
+            </a:lnRef>
+            <a:fillRef idx="1">
+              <a:schemeClr val="lt1"/>
+            </a:fillRef>
+            <a:effectRef idx="0">
+              <a:schemeClr val="accent3"/>
+            </a:effectRef>
+            <a:fontRef idx="minor">
+              <a:schemeClr val="dk1"/>
+            </a:fontRef>
+          </p:style>
+          <p:txBody>
+            <a:bodyPr rtlCol="0" anchor="ctr"/>
+            <a:lstStyle/>
+            <a:p>
+              <a:pPr algn="ctr"/>
+              <a:endParaRPr lang="ko-KR" altLang="en-US" dirty="0">
+                <a:solidFill>
+                  <a:schemeClr val="tx1"/>
+                </a:solidFill>
+                <a:latin typeface="HY동녘M" pitchFamily="18" charset="-127"/>
+                <a:ea typeface="HY동녘M" pitchFamily="18" charset="-127"/>
+              </a:endParaRPr>
+            </a:p>
+          </p:txBody>
+        </p:sp>
+      </p:grpSp>
+      <p:sp>
+        <p:nvSpPr>
+          <p:cNvPr id="30" name="이등변 삼각형 29"/>
+          <p:cNvSpPr/>
+          <p:nvPr/>
+        </p:nvSpPr>
+        <p:spPr>
+          <a:xfrm>
+            <a:off x="7439137" y="4638932"/>
+            <a:ext cx="576064" cy="289888"/>
+          </a:xfrm>
+          <a:prstGeom prst="triangle">
+            <a:avLst/>
+          </a:prstGeom>
+          <a:solidFill>
+            <a:schemeClr val="bg1"/>
+          </a:solidFill>
+          <a:ln>
+            <a:solidFill>
+              <a:schemeClr val="bg1">
+                <a:alpha val="80000"/>
+              </a:schemeClr>
+            </a:solidFill>
+          </a:ln>
+        </p:spPr>
+        <p:style>
+          <a:lnRef idx="2">
+            <a:schemeClr val="accent1">
+              <a:shade val="50000"/>
+            </a:schemeClr>
+          </a:lnRef>
+          <a:fillRef idx="1">
+            <a:schemeClr val="accent1"/>
+          </a:fillRef>
+          <a:effectRef idx="0">
+            <a:schemeClr val="accent1"/>
+          </a:effectRef>
+          <a:fontRef idx="minor">
+            <a:schemeClr val="lt1"/>
+          </a:fontRef>
+        </p:style>
+        <p:txBody>
+          <a:bodyPr rtlCol="0" anchor="ctr"/>
+          <a:lstStyle/>
+          <a:p>
+            <a:pPr algn="ctr"/>
+            <a:endParaRPr lang="ko-KR" altLang="en-US" dirty="0">
+              <a:solidFill>
+                <a:schemeClr val="tx1"/>
+              </a:solidFill>
+              <a:latin typeface="HY동녘M" pitchFamily="18" charset="-127"/>
+              <a:ea typeface="HY동녘M" pitchFamily="18" charset="-127"/>
+            </a:endParaRPr>
+          </a:p>
+        </p:txBody>
+      </p:sp>
+      <p:sp>
+        <p:nvSpPr>
+          <p:cNvPr id="31" name="이등변 삼각형 30"/>
+          <p:cNvSpPr/>
+          <p:nvPr/>
+        </p:nvSpPr>
+        <p:spPr>
+          <a:xfrm>
+            <a:off x="7367129" y="4781309"/>
+            <a:ext cx="720000" cy="363533"/>
+          </a:xfrm>
+          <a:prstGeom prst="triangle">
+            <a:avLst/>
+          </a:prstGeom>
+          <a:solidFill>
+            <a:schemeClr val="accent1">
+              <a:lumMod val="75000"/>
+            </a:schemeClr>
+          </a:solidFill>
+          <a:ln/>
+        </p:spPr>
+        <p:style>
+          <a:lnRef idx="0">
+            <a:schemeClr val="accent1"/>
+          </a:lnRef>
+          <a:fillRef idx="3">
+            <a:schemeClr val="accent1"/>
+          </a:fillRef>
+          <a:effectRef idx="3">
+            <a:schemeClr val="accent1"/>
+          </a:effectRef>
+          <a:fontRef idx="minor">
+            <a:schemeClr val="lt1"/>
+          </a:fontRef>
+        </p:style>
+        <p:txBody>
+          <a:bodyPr rtlCol="0" anchor="ctr"/>
+          <a:lstStyle/>
+          <a:p>
+            <a:pPr algn="ctr"/>
+            <a:endParaRPr lang="ko-KR" altLang="en-US" b="1" dirty="0">
+              <a:solidFill>
+                <a:schemeClr val="tx1"/>
+              </a:solidFill>
+              <a:latin typeface="HY동녘M" pitchFamily="18" charset="-127"/>
+              <a:ea typeface="HY동녘M" pitchFamily="18" charset="-127"/>
+            </a:endParaRPr>
+          </a:p>
+        </p:txBody>
+      </p:sp>
+      <p:sp>
+        <p:nvSpPr>
+          <p:cNvPr id="28" name="직사각형 27"/>
+          <p:cNvSpPr/>
+          <p:nvPr/>
+        </p:nvSpPr>
+        <p:spPr>
+          <a:xfrm>
+            <a:off x="7007089" y="5071198"/>
+            <a:ext cx="1368152" cy="577700"/>
+          </a:xfrm>
+          <a:prstGeom prst="rect">
+            <a:avLst/>
+          </a:prstGeom>
+          <a:solidFill>
+            <a:schemeClr val="accent1">
+              <a:lumMod val="75000"/>
+            </a:schemeClr>
+          </a:solidFill>
+          <a:ln/>
+        </p:spPr>
+        <p:style>
+          <a:lnRef idx="0">
+            <a:schemeClr val="accent2"/>
+          </a:lnRef>
+          <a:fillRef idx="3">
+            <a:schemeClr val="accent2"/>
+          </a:fillRef>
+          <a:effectRef idx="3">
+            <a:schemeClr val="accent2"/>
+          </a:effectRef>
+          <a:fontRef idx="minor">
+            <a:schemeClr val="lt1"/>
+          </a:fontRef>
+        </p:style>
+        <p:txBody>
+          <a:bodyPr rtlCol="0" anchor="ctr"/>
+          <a:lstStyle/>
+          <a:p>
+            <a:pPr algn="ctr"/>
+            <a:r>
+              <a:rPr lang="en-US" altLang="ko-KR" sz="1800" b="1" dirty="0" smtClean="0">
+                <a:solidFill>
+                  <a:srgbClr val="000000"/>
+                </a:solidFill>
+                <a:latin typeface="HY동녘M" pitchFamily="18" charset="-127"/>
+                <a:ea typeface="HY동녘M" pitchFamily="18" charset="-127"/>
+              </a:rPr>
+              <a:t>TCP/IP</a:t>
+            </a:r>
+            <a:endParaRPr lang="ko-KR" altLang="en-US" sz="1800" b="1" dirty="0">
+              <a:solidFill>
+                <a:srgbClr val="000000"/>
+              </a:solidFill>
+              <a:latin typeface="HY동녘M" pitchFamily="18" charset="-127"/>
+              <a:ea typeface="HY동녘M" pitchFamily="18" charset="-127"/>
+            </a:endParaRPr>
+          </a:p>
+        </p:txBody>
+      </p:sp>
       <p:sp>
         <p:nvSpPr>
           <p:cNvPr id="40" name="TextBox 39"/>
@@ -12173,7 +11959,27 @@
                 <a:latin typeface="HY동녘M" pitchFamily="18" charset="-127"/>
                 <a:ea typeface="HY동녘M" pitchFamily="18" charset="-127"/>
               </a:rPr>
-              <a:t>윈도우 프로그램을 수정 없이 사용이 가능</a:t>
+              <a:t>안드로이드 서비스들을 </a:t>
+            </a:r>
+            <a:r>
+              <a:rPr lang="en-US" altLang="ko-KR" sz="2000" dirty="0" smtClean="0">
+                <a:solidFill>
+                  <a:srgbClr val="000000"/>
+                </a:solidFill>
+                <a:latin typeface="HY동녘M" pitchFamily="18" charset="-127"/>
+                <a:ea typeface="HY동녘M" pitchFamily="18" charset="-127"/>
+              </a:rPr>
+              <a:t>USB</a:t>
+            </a:r>
+            <a:r>
+              <a:rPr lang="ko-KR" altLang="en-US" sz="2000" dirty="0" smtClean="0">
+                <a:solidFill>
+                  <a:srgbClr val="000000"/>
+                </a:solidFill>
+                <a:latin typeface="HY동녘M" pitchFamily="18" charset="-127"/>
+                <a:ea typeface="HY동녘M" pitchFamily="18" charset="-127"/>
+              </a:rPr>
+              <a:t>장치로 사용이 가능</a:t>
             </a:r>
             <a:r>
               <a:rPr lang="en-US" altLang="ko-KR" sz="2000" dirty="0" smtClean="0">
@@ -12185,6 +11991,13 @@
               </a:rPr>
               <a:t>.</a:t>
             </a:r>
+            <a:endParaRPr lang="en-US" altLang="ko-KR" sz="2000" dirty="0" smtClean="0">
+              <a:solidFill>
+                <a:srgbClr val="000000"/>
+              </a:solidFill>
+              <a:latin typeface="HY동녘M" pitchFamily="18" charset="-127"/>
+              <a:ea typeface="HY동녘M" pitchFamily="18" charset="-127"/>
+            </a:endParaRPr>
           </a:p>
           <a:p>
             <a:pPr marL="342900" indent="-342900" algn="l">
@@ -12199,7 +12012,7 @@
                 <a:latin typeface="HY동녘M" pitchFamily="18" charset="-127"/>
                 <a:ea typeface="HY동녘M" pitchFamily="18" charset="-127"/>
               </a:rPr>
-              <a:t>장치 드라이버 </a:t>
+              <a:t>윈도우 </a:t>
             </a:r>
             <a:r>
               <a:rPr lang="ko-KR" altLang="en-US" sz="2000" dirty="0" smtClean="0">
@@ -12209,37 +12022,7 @@
                 <a:latin typeface="HY동녘M" pitchFamily="18" charset="-127"/>
                 <a:ea typeface="HY동녘M" pitchFamily="18" charset="-127"/>
               </a:rPr>
-              <a:t>설치 없이 </a:t>
-            </a:r>
-            <a:r>
-              <a:rPr lang="en-US" altLang="ko-KR" sz="2000" dirty="0" smtClean="0">
-                <a:solidFill>
-                  <a:srgbClr val="000000"/>
-                </a:solidFill>
-                <a:latin typeface="HY동녘M" pitchFamily="18" charset="-127"/>
-                <a:ea typeface="HY동녘M" pitchFamily="18" charset="-127"/>
-              </a:rPr>
-              <a:t>HID USB</a:t>
-            </a:r>
-            <a:r>
-              <a:rPr lang="ko-KR" altLang="en-US" sz="2000" dirty="0" smtClean="0">
-                <a:solidFill>
-                  <a:srgbClr val="000000"/>
-                </a:solidFill>
-                <a:latin typeface="HY동녘M" pitchFamily="18" charset="-127"/>
-                <a:ea typeface="HY동녘M" pitchFamily="18" charset="-127"/>
-              </a:rPr>
-              <a:t>장치로 사용이 </a:t>
-            </a:r>
-            <a:r>
-              <a:rPr lang="ko-KR" altLang="en-US" sz="2000" dirty="0" smtClean="0">
-                <a:solidFill>
-                  <a:srgbClr val="000000"/>
-                </a:solidFill>
-                <a:latin typeface="HY동녘M" pitchFamily="18" charset="-127"/>
-                <a:ea typeface="HY동녘M" pitchFamily="18" charset="-127"/>
-              </a:rPr>
-              <a:t>가능</a:t>
+              <a:t>프로그램을 수정 없이 사용이 가능</a:t>
             </a:r>
             <a:r>
               <a:rPr lang="en-US" altLang="ko-KR" sz="2000" dirty="0" smtClean="0">
@@ -12446,10 +12229,74 @@
           </a:p>
         </p:txBody>
       </p:sp>
+      <p:pic>
+        <p:nvPicPr>
+          <p:cNvPr id="37" name="Picture 2"/>
+          <p:cNvPicPr>
+            <a:picLocks noChangeAspect="1" noChangeArrowheads="1"/>
+          </p:cNvPicPr>
+          <p:nvPr/>
+        </p:nvPicPr>
+        <p:blipFill>
+          <a:blip r:embed="rId3" cstate="print"/>
+          <a:srcRect/>
+          <a:stretch>
+            <a:fillRect/>
+          </a:stretch>
+        </p:blipFill>
+        <p:spPr bwMode="auto">
+          <a:xfrm>
+            <a:off x="3419872" y="5661248"/>
+            <a:ext cx="1656184" cy="664881"/>
+          </a:xfrm>
+          <a:prstGeom prst="rect">
+            <a:avLst/>
+          </a:prstGeom>
+          <a:noFill/>
+          <a:ln w="9525">
+            <a:noFill/>
+            <a:miter lim="800000"/>
+            <a:headEnd/>
+            <a:tailEnd/>
+          </a:ln>
+        </p:spPr>
+      </p:pic>
+      <p:pic>
+        <p:nvPicPr>
+          <p:cNvPr id="38" name="Picture 2"/>
+          <p:cNvPicPr>
+            <a:picLocks noChangeAspect="1" noChangeArrowheads="1"/>
+          </p:cNvPicPr>
+          <p:nvPr/>
+        </p:nvPicPr>
+        <p:blipFill>
+          <a:blip r:embed="rId3" cstate="print"/>
+          <a:srcRect/>
+          <a:stretch>
+            <a:fillRect/>
+          </a:stretch>
+        </p:blipFill>
+        <p:spPr bwMode="auto">
+          <a:xfrm>
+            <a:off x="7020272" y="5661248"/>
+            <a:ext cx="1656184" cy="664881"/>
+          </a:xfrm>
+          <a:prstGeom prst="rect">
+            <a:avLst/>
+          </a:prstGeom>
+          <a:noFill/>
+          <a:ln w="9525">
+            <a:noFill/>
+            <a:miter lim="800000"/>
+            <a:headEnd/>
+            <a:tailEnd/>
+          </a:ln>
+        </p:spPr>
+      </p:pic>
     </p:spTree>
     <p:extLst>
       <p:ext uri="{BB962C8B-B14F-4D97-AF65-F5344CB8AC3E}">
-        <p14:creationId xmlns:p14="http://schemas.microsoft.com/office/powerpoint/2010/main" xmlns="" val="1410092498"/>
+        <p14:creationId xmlns="" xmlns:p14="http://schemas.microsoft.com/office/powerpoint/2010/main" val="1410092498"/>
       </p:ext>
     </p:extLst>
   </p:cSld>
@@ -12570,7 +12417,7 @@
           <a:blip r:embed="rId3" cstate="print">
             <a:extLst>
               <a:ext uri="{28A0092B-C50C-407E-A947-70E740481C1C}">
-                <a14:useLocalDpi xmlns="" xmlns:a14="http://schemas.microsoft.com/office/drawing/2010/main" val="0"/>
+                <a14:useLocalDpi xmlns:a14="http://schemas.microsoft.com/office/drawing/2010/main" xmlns="" val="0"/>
               </a:ext>
             </a:extLst>
           </a:blip>
@@ -12695,7 +12542,7 @@
           <a:blip r:embed="rId4" cstate="print">
             <a:extLst>
               <a:ext uri="{28A0092B-C50C-407E-A947-70E740481C1C}">
-                <a14:useLocalDpi xmlns="" xmlns:a14="http://schemas.microsoft.com/office/drawing/2010/main" val="0"/>
+                <a14:useLocalDpi xmlns:a14="http://schemas.microsoft.com/office/drawing/2010/main" xmlns="" val="0"/>
               </a:ext>
             </a:extLst>
           </a:blip>
@@ -12715,7 +12562,7 @@
           <a:noFill/>
           <a:extLst>
             <a:ext uri="{909E8E84-426E-40DD-AFC4-6F175D3DCCD1}">
-              <a14:hiddenFill xmlns="" xmlns:a14="http://schemas.microsoft.com/office/drawing/2010/main">
+              <a14:hiddenFill xmlns:a14="http://schemas.microsoft.com/office/drawing/2010/main" xmlns="">
                 <a:solidFill>
                   <a:srgbClr val="FFFFFF"/>
                 </a:solidFill>
@@ -12736,7 +12583,7 @@
           <a:blip r:embed="rId5" cstate="print">
             <a:extLst>
               <a:ext uri="{28A0092B-C50C-407E-A947-70E740481C1C}">
-                <a14:useLocalDpi xmlns="" xmlns:a14="http://schemas.microsoft.com/office/drawing/2010/main" val="0"/>
+                <a14:useLocalDpi xmlns:a14="http://schemas.microsoft.com/office/drawing/2010/main" xmlns="" val="0"/>
               </a:ext>
             </a:extLst>
           </a:blip>
@@ -12756,7 +12603,7 @@
           <a:noFill/>
           <a:extLst>
             <a:ext uri="{909E8E84-426E-40DD-AFC4-6F175D3DCCD1}">
-              <a14:hiddenFill xmlns="" xmlns:a14="http://schemas.microsoft.com/office/drawing/2010/main">
+              <a14:hiddenFill xmlns:a14="http://schemas.microsoft.com/office/drawing/2010/main" xmlns="">
                 <a:solidFill>
                   <a:srgbClr val="FFFFFF"/>
                 </a:solidFill>
@@ -12777,7 +12624,7 @@
           <a:blip r:embed="rId6" cstate="print">
             <a:extLst>
               <a:ext uri="{28A0092B-C50C-407E-A947-70E740481C1C}">
-                <a14:useLocalDpi xmlns="" xmlns:a14="http://schemas.microsoft.com/office/drawing/2010/main" val="0"/>
+                <a14:useLocalDpi xmlns:a14="http://schemas.microsoft.com/office/drawing/2010/main" xmlns="" val="0"/>
               </a:ext>
             </a:extLst>
           </a:blip>
@@ -12797,7 +12644,7 @@
           <a:noFill/>
           <a:extLst>
             <a:ext uri="{909E8E84-426E-40DD-AFC4-6F175D3DCCD1}">
-              <a14:hiddenFill xmlns="" xmlns:a14="http://schemas.microsoft.com/office/drawing/2010/main">
+              <a14:hiddenFill xmlns:a14="http://schemas.microsoft.com/office/drawing/2010/main" xmlns="">
                 <a:solidFill>
                   <a:srgbClr val="FFFFFF"/>
                 </a:solidFill>
@@ -12818,7 +12665,7 @@
           <a:blip r:embed="rId5" cstate="print">
             <a:extLst>
               <a:ext uri="{28A0092B-C50C-407E-A947-70E740481C1C}">
-                <a14:useLocalDpi xmlns="" xmlns:a14="http://schemas.microsoft.com/office/drawing/2010/main" val="0"/>
+                <a14:useLocalDpi xmlns:a14="http://schemas.microsoft.com/office/drawing/2010/main" xmlns="" val="0"/>
               </a:ext>
             </a:extLst>
           </a:blip>
@@ -12838,7 +12685,7 @@
           <a:noFill/>
           <a:extLst>
             <a:ext uri="{909E8E84-426E-40DD-AFC4-6F175D3DCCD1}">
-              <a14:hiddenFill xmlns="" xmlns:a14="http://schemas.microsoft.com/office/drawing/2010/main">
+              <a14:hiddenFill xmlns:a14="http://schemas.microsoft.com/office/drawing/2010/main" xmlns="">
                 <a:solidFill>
                   <a:srgbClr val="FFFFFF"/>
                 </a:solidFill>
@@ -12859,7 +12706,7 @@
           <a:blip r:embed="rId6" cstate="print">
             <a:extLst>
               <a:ext uri="{28A0092B-C50C-407E-A947-70E740481C1C}">
-                <a14:useLocalDpi xmlns="" xmlns:a14="http://schemas.microsoft.com/office/drawing/2010/main" val="0"/>
+                <a14:useLocalDpi xmlns:a14="http://schemas.microsoft.com/office/drawing/2010/main" xmlns="" val="0"/>
               </a:ext>
             </a:extLst>
           </a:blip>
@@ -12879,7 +12726,7 @@
           <a:noFill/>
           <a:extLst>
             <a:ext uri="{909E8E84-426E-40DD-AFC4-6F175D3DCCD1}">
-              <a14:hiddenFill xmlns="" xmlns:a14="http://schemas.microsoft.com/office/drawing/2010/main">
+              <a14:hiddenFill xmlns:a14="http://schemas.microsoft.com/office/drawing/2010/main" xmlns="">
                 <a:solidFill>
                   <a:srgbClr val="FFFFFF"/>
                 </a:solidFill>
@@ -12976,7 +12823,7 @@
           <a:blip r:embed="rId7" cstate="print">
             <a:extLst>
               <a:ext uri="{28A0092B-C50C-407E-A947-70E740481C1C}">
-                <a14:useLocalDpi xmlns="" xmlns:a14="http://schemas.microsoft.com/office/drawing/2010/main" val="0"/>
+                <a14:useLocalDpi xmlns:a14="http://schemas.microsoft.com/office/drawing/2010/main" xmlns="" val="0"/>
               </a:ext>
             </a:extLst>
           </a:blip>
@@ -12996,7 +12843,7 @@
           <a:noFill/>
           <a:extLst>
             <a:ext uri="{909E8E84-426E-40DD-AFC4-6F175D3DCCD1}">
-              <a14:hiddenFill xmlns="" xmlns:a14="http://schemas.microsoft.com/office/drawing/2010/main">
+              <a14:hiddenFill xmlns:a14="http://schemas.microsoft.com/office/drawing/2010/main" xmlns="">
                 <a:solidFill>
                   <a:srgbClr val="FFFFFF"/>
                 </a:solidFill>
@@ -13017,7 +12864,7 @@
           <a:blip r:embed="rId8" cstate="print">
             <a:extLst>
               <a:ext uri="{28A0092B-C50C-407E-A947-70E740481C1C}">
-                <a14:useLocalDpi xmlns="" xmlns:a14="http://schemas.microsoft.com/office/drawing/2010/main" val="0"/>
+                <a14:useLocalDpi xmlns:a14="http://schemas.microsoft.com/office/drawing/2010/main" xmlns="" val="0"/>
               </a:ext>
             </a:extLst>
           </a:blip>
@@ -13037,7 +12884,7 @@
           <a:noFill/>
           <a:extLst>
             <a:ext uri="{909E8E84-426E-40DD-AFC4-6F175D3DCCD1}">
-              <a14:hiddenFill xmlns="" xmlns:a14="http://schemas.microsoft.com/office/drawing/2010/main">
+              <a14:hiddenFill xmlns:a14="http://schemas.microsoft.com/office/drawing/2010/main" xmlns="">
                 <a:solidFill>
                   <a:srgbClr val="FFFFFF"/>
                 </a:solidFill>
@@ -13058,7 +12905,7 @@
           <a:blip r:embed="rId9" cstate="print">
             <a:extLst>
               <a:ext uri="{28A0092B-C50C-407E-A947-70E740481C1C}">
-                <a14:useLocalDpi xmlns="" xmlns:a14="http://schemas.microsoft.com/office/drawing/2010/main" val="0"/>
+                <a14:useLocalDpi xmlns:a14="http://schemas.microsoft.com/office/drawing/2010/main" xmlns="" val="0"/>
               </a:ext>
             </a:extLst>
           </a:blip>
@@ -13078,7 +12925,7 @@
           <a:noFill/>
           <a:extLst>
             <a:ext uri="{909E8E84-426E-40DD-AFC4-6F175D3DCCD1}">
-              <a14:hiddenFill xmlns="" xmlns:a14="http://schemas.microsoft.com/office/drawing/2010/main">
+              <a14:hiddenFill xmlns:a14="http://schemas.microsoft.com/office/drawing/2010/main" xmlns="">
                 <a:solidFill>
                   <a:srgbClr val="FFFFFF"/>
                 </a:solidFill>
@@ -13099,7 +12946,7 @@
           <a:blip r:embed="rId10" cstate="print">
             <a:extLst>
               <a:ext uri="{28A0092B-C50C-407E-A947-70E740481C1C}">
-                <a14:useLocalDpi xmlns="" xmlns:a14="http://schemas.microsoft.com/office/drawing/2010/main" val="0"/>
+                <a14:useLocalDpi xmlns:a14="http://schemas.microsoft.com/office/drawing/2010/main" xmlns="" val="0"/>
               </a:ext>
             </a:extLst>
           </a:blip>
@@ -13119,7 +12966,7 @@
           <a:noFill/>
           <a:extLst>
             <a:ext uri="{909E8E84-426E-40DD-AFC4-6F175D3DCCD1}">
-              <a14:hiddenFill xmlns="" xmlns:a14="http://schemas.microsoft.com/office/drawing/2010/main">
+              <a14:hiddenFill xmlns:a14="http://schemas.microsoft.com/office/drawing/2010/main" xmlns="">
                 <a:solidFill>
                   <a:srgbClr val="FFFFFF"/>
                 </a:solidFill>
@@ -13131,7 +12978,7 @@
     </p:spTree>
     <p:extLst>
       <p:ext uri="{BB962C8B-B14F-4D97-AF65-F5344CB8AC3E}">
-        <p14:creationId xmlns="" xmlns:p14="http://schemas.microsoft.com/office/powerpoint/2010/main" val="1407908346"/>
+        <p14:creationId xmlns:p14="http://schemas.microsoft.com/office/powerpoint/2010/main" xmlns="" val="1407908346"/>
       </p:ext>
     </p:extLst>
   </p:cSld>
@@ -13446,7 +13293,7 @@
         <a:effectLst/>
         <a:extLst>
           <a:ext uri="{91240B29-F687-4F45-9708-019B960494DF}">
-            <a14:hiddenLine xmlns:a14="http://schemas.microsoft.com/office/drawing/2010/main" xmlns="" w="9525" cap="flat" cmpd="sng" algn="ctr">
+            <a14:hiddenLine xmlns="" xmlns:a14="http://schemas.microsoft.com/office/drawing/2010/main" w="9525" cap="flat" cmpd="sng" algn="ctr">
               <a:solidFill>
                 <a:schemeClr val="tx1"/>
               </a:solidFill>
@@ -13457,7 +13304,7 @@
             </a14:hiddenLine>
           </a:ext>
           <a:ext uri="{AF507438-7753-43E0-B8FC-AC1667EBCBE1}">
-            <a14:hiddenEffects xmlns:a14="http://schemas.microsoft.com/office/drawing/2010/main" xmlns="">
+            <a14:hiddenEffects xmlns="" xmlns:a14="http://schemas.microsoft.com/office/drawing/2010/main">
               <a:effectLst>
                 <a:outerShdw dist="35921" dir="2700000" algn="ctr" rotWithShape="0">
                   <a:schemeClr val="bg2"/>

</xml_diff>